<commit_message>
23maj info feladatsorhoz alvas.sql file hogy ne kelljen accessben csinalni
</commit_message>
<xml_diff>
--- a/Kadarkuti_Marton/_ERETTSEGI_GYAKR/23maj22info/henger.pptx
+++ b/Kadarkuti_Marton/_ERETTSEGI_GYAKR/23maj22info/henger.pptx
@@ -5,10 +5,10 @@
     <p:sldMasterId id="2147483660" r:id="rId1"/>
   </p:sldMasterIdLst>
   <p:sldIdLst>
-    <p:sldId id="257" r:id="rId2"/>
-    <p:sldId id="256" r:id="rId3"/>
-    <p:sldId id="259" r:id="rId4"/>
-    <p:sldId id="260" r:id="rId5"/>
+    <p:sldId id="256" r:id="rId2"/>
+    <p:sldId id="259" r:id="rId3"/>
+    <p:sldId id="260" r:id="rId4"/>
+    <p:sldId id="261" r:id="rId5"/>
   </p:sldIdLst>
   <p:sldSz cx="11520488" cy="6480175"/>
   <p:notesSz cx="6858000" cy="9144000"/>
@@ -107,6 +107,11 @@
       </a:defRPr>
     </a:lvl9pPr>
   </p:defaultTextStyle>
+  <p:extLst>
+    <p:ext uri="{EFAFB233-063F-42B5-8137-9DF3F51BA10A}">
+      <p15:sldGuideLst xmlns:p15="http://schemas.microsoft.com/office/powerpoint/2012/main"/>
+    </p:ext>
+  </p:extLst>
 </p:presentation>
 </file>
 
@@ -442,7 +447,7 @@
           <a:p>
             <a:fld id="{B61DC172-F6B7-4797-B2AE-E885AB9F32E8}" type="datetimeFigureOut">
               <a:rPr lang="hu-HU" smtClean="0"/>
-              <a:t>2024. 12. 17.</a:t>
+              <a:t>2024. 12. 27.</a:t>
             </a:fld>
             <a:endParaRPr lang="hu-HU"/>
           </a:p>
@@ -612,7 +617,7 @@
           <a:p>
             <a:fld id="{B61DC172-F6B7-4797-B2AE-E885AB9F32E8}" type="datetimeFigureOut">
               <a:rPr lang="hu-HU" smtClean="0"/>
-              <a:t>2024. 12. 17.</a:t>
+              <a:t>2024. 12. 27.</a:t>
             </a:fld>
             <a:endParaRPr lang="hu-HU"/>
           </a:p>
@@ -792,7 +797,7 @@
           <a:p>
             <a:fld id="{B61DC172-F6B7-4797-B2AE-E885AB9F32E8}" type="datetimeFigureOut">
               <a:rPr lang="hu-HU" smtClean="0"/>
-              <a:t>2024. 12. 17.</a:t>
+              <a:t>2024. 12. 27.</a:t>
             </a:fld>
             <a:endParaRPr lang="hu-HU"/>
           </a:p>
@@ -962,7 +967,7 @@
           <a:p>
             <a:fld id="{B61DC172-F6B7-4797-B2AE-E885AB9F32E8}" type="datetimeFigureOut">
               <a:rPr lang="hu-HU" smtClean="0"/>
-              <a:t>2024. 12. 17.</a:t>
+              <a:t>2024. 12. 27.</a:t>
             </a:fld>
             <a:endParaRPr lang="hu-HU"/>
           </a:p>
@@ -1208,7 +1213,7 @@
           <a:p>
             <a:fld id="{B61DC172-F6B7-4797-B2AE-E885AB9F32E8}" type="datetimeFigureOut">
               <a:rPr lang="hu-HU" smtClean="0"/>
-              <a:t>2024. 12. 17.</a:t>
+              <a:t>2024. 12. 27.</a:t>
             </a:fld>
             <a:endParaRPr lang="hu-HU"/>
           </a:p>
@@ -1440,7 +1445,7 @@
           <a:p>
             <a:fld id="{B61DC172-F6B7-4797-B2AE-E885AB9F32E8}" type="datetimeFigureOut">
               <a:rPr lang="hu-HU" smtClean="0"/>
-              <a:t>2024. 12. 17.</a:t>
+              <a:t>2024. 12. 27.</a:t>
             </a:fld>
             <a:endParaRPr lang="hu-HU"/>
           </a:p>
@@ -1807,7 +1812,7 @@
           <a:p>
             <a:fld id="{B61DC172-F6B7-4797-B2AE-E885AB9F32E8}" type="datetimeFigureOut">
               <a:rPr lang="hu-HU" smtClean="0"/>
-              <a:t>2024. 12. 17.</a:t>
+              <a:t>2024. 12. 27.</a:t>
             </a:fld>
             <a:endParaRPr lang="hu-HU"/>
           </a:p>
@@ -1925,7 +1930,7 @@
           <a:p>
             <a:fld id="{B61DC172-F6B7-4797-B2AE-E885AB9F32E8}" type="datetimeFigureOut">
               <a:rPr lang="hu-HU" smtClean="0"/>
-              <a:t>2024. 12. 17.</a:t>
+              <a:t>2024. 12. 27.</a:t>
             </a:fld>
             <a:endParaRPr lang="hu-HU"/>
           </a:p>
@@ -2020,7 +2025,7 @@
           <a:p>
             <a:fld id="{B61DC172-F6B7-4797-B2AE-E885AB9F32E8}" type="datetimeFigureOut">
               <a:rPr lang="hu-HU" smtClean="0"/>
-              <a:t>2024. 12. 17.</a:t>
+              <a:t>2024. 12. 27.</a:t>
             </a:fld>
             <a:endParaRPr lang="hu-HU"/>
           </a:p>
@@ -2297,7 +2302,7 @@
           <a:p>
             <a:fld id="{B61DC172-F6B7-4797-B2AE-E885AB9F32E8}" type="datetimeFigureOut">
               <a:rPr lang="hu-HU" smtClean="0"/>
-              <a:t>2024. 12. 17.</a:t>
+              <a:t>2024. 12. 27.</a:t>
             </a:fld>
             <a:endParaRPr lang="hu-HU"/>
           </a:p>
@@ -2554,7 +2559,7 @@
           <a:p>
             <a:fld id="{B61DC172-F6B7-4797-B2AE-E885AB9F32E8}" type="datetimeFigureOut">
               <a:rPr lang="hu-HU" smtClean="0"/>
-              <a:t>2024. 12. 17.</a:t>
+              <a:t>2024. 12. 27.</a:t>
             </a:fld>
             <a:endParaRPr lang="hu-HU"/>
           </a:p>
@@ -2767,7 +2772,7 @@
           <a:p>
             <a:fld id="{B61DC172-F6B7-4797-B2AE-E885AB9F32E8}" type="datetimeFigureOut">
               <a:rPr lang="hu-HU" smtClean="0"/>
-              <a:t>2024. 12. 17.</a:t>
+              <a:t>2024. 12. 27.</a:t>
             </a:fld>
             <a:endParaRPr lang="hu-HU"/>
           </a:p>
@@ -3210,129 +3215,6 @@
             <p:ph type="ctrTitle"/>
           </p:nvPr>
         </p:nvSpPr>
-        <p:spPr/>
-        <p:txBody>
-          <a:bodyPr>
-            <a:normAutofit/>
-          </a:bodyPr>
-          <a:lstStyle/>
-          <a:p>
-            <a:r>
-              <a:rPr lang="hu-HU" sz="4300" dirty="0">
-                <a:latin typeface="Arial" panose="020B0604020202020204" pitchFamily="34" charset="0"/>
-                <a:cs typeface="Arial" panose="020B0604020202020204" pitchFamily="34" charset="0"/>
-              </a:rPr>
-              <a:t>A forgáshenger</a:t>
-            </a:r>
-          </a:p>
-        </p:txBody>
-      </p:sp>
-      <p:sp>
-        <p:nvSpPr>
-          <p:cNvPr id="4" name="Szövegdoboz 3">
-            <a:extLst>
-              <a:ext uri="{FF2B5EF4-FFF2-40B4-BE49-F238E27FC236}">
-                <a16:creationId xmlns:a16="http://schemas.microsoft.com/office/drawing/2014/main" id="{AF45033E-0A8C-42E3-8689-C365066D099D}"/>
-              </a:ext>
-            </a:extLst>
-          </p:cNvPr>
-          <p:cNvSpPr txBox="1"/>
-          <p:nvPr/>
-        </p:nvSpPr>
-        <p:spPr>
-          <a:xfrm>
-            <a:off x="5007935" y="3976577"/>
-            <a:ext cx="1069524" cy="446276"/>
-          </a:xfrm>
-          <a:prstGeom prst="rect">
-            <a:avLst/>
-          </a:prstGeom>
-          <a:noFill/>
-        </p:spPr>
-        <p:txBody>
-          <a:bodyPr wrap="none" rtlCol="0">
-            <a:spAutoFit/>
-          </a:bodyPr>
-          <a:lstStyle/>
-          <a:p>
-            <a:r>
-              <a:rPr lang="hu-HU" sz="2300" dirty="0">
-                <a:latin typeface="Times New Roman" panose="02020603050405020304" pitchFamily="18" charset="0"/>
-                <a:cs typeface="Times New Roman" panose="02020603050405020304" pitchFamily="18" charset="0"/>
-              </a:rPr>
-              <a:t>kisfiam</a:t>
-            </a:r>
-          </a:p>
-        </p:txBody>
-      </p:sp>
-    </p:spTree>
-    <p:extLst>
-      <p:ext uri="{BB962C8B-B14F-4D97-AF65-F5344CB8AC3E}">
-        <p14:creationId xmlns:p14="http://schemas.microsoft.com/office/powerpoint/2010/main" val="1690064455"/>
-      </p:ext>
-    </p:extLst>
-  </p:cSld>
-  <p:clrMapOvr>
-    <a:masterClrMapping/>
-  </p:clrMapOvr>
-</p:sld>
-</file>
-
-<file path=ppt/slides/slide2.xml><?xml version="1.0" encoding="utf-8"?>
-<p:sld xmlns:a="http://schemas.openxmlformats.org/drawingml/2006/main" xmlns:r="http://schemas.openxmlformats.org/officeDocument/2006/relationships" xmlns:p="http://schemas.openxmlformats.org/presentationml/2006/main">
-  <p:cSld>
-    <p:bg>
-      <p:bgPr>
-        <a:gradFill flip="none" rotWithShape="1">
-          <a:gsLst>
-            <a:gs pos="0">
-              <a:schemeClr val="accent1">
-                <a:lumMod val="5000"/>
-                <a:lumOff val="95000"/>
-              </a:schemeClr>
-            </a:gs>
-            <a:gs pos="100000">
-              <a:srgbClr val="819839"/>
-            </a:gs>
-          </a:gsLst>
-          <a:path path="circle">
-            <a:fillToRect l="50000" t="50000" r="50000" b="50000"/>
-          </a:path>
-          <a:tileRect/>
-        </a:gradFill>
-        <a:effectLst/>
-      </p:bgPr>
-    </p:bg>
-    <p:spTree>
-      <p:nvGrpSpPr>
-        <p:cNvPr id="1" name=""/>
-        <p:cNvGrpSpPr/>
-        <p:nvPr/>
-      </p:nvGrpSpPr>
-      <p:grpSpPr>
-        <a:xfrm>
-          <a:off x="0" y="0"/>
-          <a:ext cx="0" cy="0"/>
-          <a:chOff x="0" y="0"/>
-          <a:chExt cx="0" cy="0"/>
-        </a:xfrm>
-      </p:grpSpPr>
-      <p:sp>
-        <p:nvSpPr>
-          <p:cNvPr id="2" name="Cím 1">
-            <a:extLst>
-              <a:ext uri="{FF2B5EF4-FFF2-40B4-BE49-F238E27FC236}">
-                <a16:creationId xmlns:a16="http://schemas.microsoft.com/office/drawing/2014/main" id="{B7B97560-B2C4-45DE-8234-79594CB1856B}"/>
-              </a:ext>
-            </a:extLst>
-          </p:cNvPr>
-          <p:cNvSpPr>
-            <a:spLocks noGrp="1"/>
-          </p:cNvSpPr>
-          <p:nvPr>
-            <p:ph type="ctrTitle"/>
-          </p:nvPr>
-        </p:nvSpPr>
         <p:spPr>
           <a:xfrm>
             <a:off x="1440061" y="2112057"/>
@@ -3548,10 +3430,459 @@
   <p:clrMapOvr>
     <a:masterClrMapping/>
   </p:clrMapOvr>
+  <p:timing>
+    <p:tnLst>
+      <p:par>
+        <p:cTn id="1" dur="indefinite" restart="never" nodeType="tmRoot">
+          <p:childTnLst>
+            <p:seq concurrent="1" nextAc="seek">
+              <p:cTn id="2" dur="indefinite" nodeType="mainSeq">
+                <p:childTnLst>
+                  <p:par>
+                    <p:cTn id="3" fill="hold">
+                      <p:stCondLst>
+                        <p:cond delay="indefinite"/>
+                      </p:stCondLst>
+                      <p:childTnLst>
+                        <p:par>
+                          <p:cTn id="4" fill="hold">
+                            <p:stCondLst>
+                              <p:cond delay="0"/>
+                            </p:stCondLst>
+                            <p:childTnLst>
+                              <p:par>
+                                <p:cTn id="5" presetID="2" presetClass="entr" presetSubtype="4" fill="hold" nodeType="clickEffect">
+                                  <p:stCondLst>
+                                    <p:cond delay="0"/>
+                                  </p:stCondLst>
+                                  <p:childTnLst>
+                                    <p:set>
+                                      <p:cBhvr>
+                                        <p:cTn id="6" dur="1" fill="hold">
+                                          <p:stCondLst>
+                                            <p:cond delay="0"/>
+                                          </p:stCondLst>
+                                        </p:cTn>
+                                        <p:tgtEl>
+                                          <p:spTgt spid="13"/>
+                                        </p:tgtEl>
+                                        <p:attrNameLst>
+                                          <p:attrName>style.visibility</p:attrName>
+                                        </p:attrNameLst>
+                                      </p:cBhvr>
+                                      <p:to>
+                                        <p:strVal val="visible"/>
+                                      </p:to>
+                                    </p:set>
+                                    <p:anim calcmode="lin" valueType="num">
+                                      <p:cBhvr additive="base">
+                                        <p:cTn id="7" dur="500" fill="hold"/>
+                                        <p:tgtEl>
+                                          <p:spTgt spid="13"/>
+                                        </p:tgtEl>
+                                        <p:attrNameLst>
+                                          <p:attrName>ppt_x</p:attrName>
+                                        </p:attrNameLst>
+                                      </p:cBhvr>
+                                      <p:tavLst>
+                                        <p:tav tm="0">
+                                          <p:val>
+                                            <p:strVal val="#ppt_x"/>
+                                          </p:val>
+                                        </p:tav>
+                                        <p:tav tm="100000">
+                                          <p:val>
+                                            <p:strVal val="#ppt_x"/>
+                                          </p:val>
+                                        </p:tav>
+                                      </p:tavLst>
+                                    </p:anim>
+                                    <p:anim calcmode="lin" valueType="num">
+                                      <p:cBhvr additive="base">
+                                        <p:cTn id="8" dur="500" fill="hold"/>
+                                        <p:tgtEl>
+                                          <p:spTgt spid="13"/>
+                                        </p:tgtEl>
+                                        <p:attrNameLst>
+                                          <p:attrName>ppt_y</p:attrName>
+                                        </p:attrNameLst>
+                                      </p:cBhvr>
+                                      <p:tavLst>
+                                        <p:tav tm="0">
+                                          <p:val>
+                                            <p:strVal val="1+#ppt_h/2"/>
+                                          </p:val>
+                                        </p:tav>
+                                        <p:tav tm="100000">
+                                          <p:val>
+                                            <p:strVal val="#ppt_y"/>
+                                          </p:val>
+                                        </p:tav>
+                                      </p:tavLst>
+                                    </p:anim>
+                                  </p:childTnLst>
+                                </p:cTn>
+                              </p:par>
+                            </p:childTnLst>
+                          </p:cTn>
+                        </p:par>
+                        <p:par>
+                          <p:cTn id="9" fill="hold">
+                            <p:stCondLst>
+                              <p:cond delay="500"/>
+                            </p:stCondLst>
+                            <p:childTnLst>
+                              <p:par>
+                                <p:cTn id="10" presetID="2" presetClass="entr" presetSubtype="4" fill="hold" nodeType="afterEffect">
+                                  <p:stCondLst>
+                                    <p:cond delay="500"/>
+                                  </p:stCondLst>
+                                  <p:childTnLst>
+                                    <p:set>
+                                      <p:cBhvr>
+                                        <p:cTn id="11" dur="1" fill="hold">
+                                          <p:stCondLst>
+                                            <p:cond delay="0"/>
+                                          </p:stCondLst>
+                                        </p:cTn>
+                                        <p:tgtEl>
+                                          <p:spTgt spid="7"/>
+                                        </p:tgtEl>
+                                        <p:attrNameLst>
+                                          <p:attrName>style.visibility</p:attrName>
+                                        </p:attrNameLst>
+                                      </p:cBhvr>
+                                      <p:to>
+                                        <p:strVal val="visible"/>
+                                      </p:to>
+                                    </p:set>
+                                    <p:anim calcmode="lin" valueType="num">
+                                      <p:cBhvr additive="base">
+                                        <p:cTn id="12" dur="500" fill="hold"/>
+                                        <p:tgtEl>
+                                          <p:spTgt spid="7"/>
+                                        </p:tgtEl>
+                                        <p:attrNameLst>
+                                          <p:attrName>ppt_x</p:attrName>
+                                        </p:attrNameLst>
+                                      </p:cBhvr>
+                                      <p:tavLst>
+                                        <p:tav tm="0">
+                                          <p:val>
+                                            <p:strVal val="#ppt_x"/>
+                                          </p:val>
+                                        </p:tav>
+                                        <p:tav tm="100000">
+                                          <p:val>
+                                            <p:strVal val="#ppt_x"/>
+                                          </p:val>
+                                        </p:tav>
+                                      </p:tavLst>
+                                    </p:anim>
+                                    <p:anim calcmode="lin" valueType="num">
+                                      <p:cBhvr additive="base">
+                                        <p:cTn id="13" dur="500" fill="hold"/>
+                                        <p:tgtEl>
+                                          <p:spTgt spid="7"/>
+                                        </p:tgtEl>
+                                        <p:attrNameLst>
+                                          <p:attrName>ppt_y</p:attrName>
+                                        </p:attrNameLst>
+                                      </p:cBhvr>
+                                      <p:tavLst>
+                                        <p:tav tm="0">
+                                          <p:val>
+                                            <p:strVal val="1+#ppt_h/2"/>
+                                          </p:val>
+                                        </p:tav>
+                                        <p:tav tm="100000">
+                                          <p:val>
+                                            <p:strVal val="#ppt_y"/>
+                                          </p:val>
+                                        </p:tav>
+                                      </p:tavLst>
+                                    </p:anim>
+                                  </p:childTnLst>
+                                </p:cTn>
+                              </p:par>
+                            </p:childTnLst>
+                          </p:cTn>
+                        </p:par>
+                        <p:par>
+                          <p:cTn id="14" fill="hold">
+                            <p:stCondLst>
+                              <p:cond delay="1500"/>
+                            </p:stCondLst>
+                            <p:childTnLst>
+                              <p:par>
+                                <p:cTn id="15" presetID="2" presetClass="entr" presetSubtype="4" fill="hold" nodeType="afterEffect">
+                                  <p:stCondLst>
+                                    <p:cond delay="500"/>
+                                  </p:stCondLst>
+                                  <p:childTnLst>
+                                    <p:set>
+                                      <p:cBhvr>
+                                        <p:cTn id="16" dur="1" fill="hold">
+                                          <p:stCondLst>
+                                            <p:cond delay="0"/>
+                                          </p:stCondLst>
+                                        </p:cTn>
+                                        <p:tgtEl>
+                                          <p:spTgt spid="5"/>
+                                        </p:tgtEl>
+                                        <p:attrNameLst>
+                                          <p:attrName>style.visibility</p:attrName>
+                                        </p:attrNameLst>
+                                      </p:cBhvr>
+                                      <p:to>
+                                        <p:strVal val="visible"/>
+                                      </p:to>
+                                    </p:set>
+                                    <p:anim calcmode="lin" valueType="num">
+                                      <p:cBhvr additive="base">
+                                        <p:cTn id="17" dur="500" fill="hold"/>
+                                        <p:tgtEl>
+                                          <p:spTgt spid="5"/>
+                                        </p:tgtEl>
+                                        <p:attrNameLst>
+                                          <p:attrName>ppt_x</p:attrName>
+                                        </p:attrNameLst>
+                                      </p:cBhvr>
+                                      <p:tavLst>
+                                        <p:tav tm="0">
+                                          <p:val>
+                                            <p:strVal val="#ppt_x"/>
+                                          </p:val>
+                                        </p:tav>
+                                        <p:tav tm="100000">
+                                          <p:val>
+                                            <p:strVal val="#ppt_x"/>
+                                          </p:val>
+                                        </p:tav>
+                                      </p:tavLst>
+                                    </p:anim>
+                                    <p:anim calcmode="lin" valueType="num">
+                                      <p:cBhvr additive="base">
+                                        <p:cTn id="18" dur="500" fill="hold"/>
+                                        <p:tgtEl>
+                                          <p:spTgt spid="5"/>
+                                        </p:tgtEl>
+                                        <p:attrNameLst>
+                                          <p:attrName>ppt_y</p:attrName>
+                                        </p:attrNameLst>
+                                      </p:cBhvr>
+                                      <p:tavLst>
+                                        <p:tav tm="0">
+                                          <p:val>
+                                            <p:strVal val="1+#ppt_h/2"/>
+                                          </p:val>
+                                        </p:tav>
+                                        <p:tav tm="100000">
+                                          <p:val>
+                                            <p:strVal val="#ppt_y"/>
+                                          </p:val>
+                                        </p:tav>
+                                      </p:tavLst>
+                                    </p:anim>
+                                  </p:childTnLst>
+                                </p:cTn>
+                              </p:par>
+                            </p:childTnLst>
+                          </p:cTn>
+                        </p:par>
+                        <p:par>
+                          <p:cTn id="19" fill="hold">
+                            <p:stCondLst>
+                              <p:cond delay="2500"/>
+                            </p:stCondLst>
+                            <p:childTnLst>
+                              <p:par>
+                                <p:cTn id="20" presetID="2" presetClass="entr" presetSubtype="4" fill="hold" nodeType="afterEffect">
+                                  <p:stCondLst>
+                                    <p:cond delay="500"/>
+                                  </p:stCondLst>
+                                  <p:childTnLst>
+                                    <p:set>
+                                      <p:cBhvr>
+                                        <p:cTn id="21" dur="1" fill="hold">
+                                          <p:stCondLst>
+                                            <p:cond delay="0"/>
+                                          </p:stCondLst>
+                                        </p:cTn>
+                                        <p:tgtEl>
+                                          <p:spTgt spid="11"/>
+                                        </p:tgtEl>
+                                        <p:attrNameLst>
+                                          <p:attrName>style.visibility</p:attrName>
+                                        </p:attrNameLst>
+                                      </p:cBhvr>
+                                      <p:to>
+                                        <p:strVal val="visible"/>
+                                      </p:to>
+                                    </p:set>
+                                    <p:anim calcmode="lin" valueType="num">
+                                      <p:cBhvr additive="base">
+                                        <p:cTn id="22" dur="500" fill="hold"/>
+                                        <p:tgtEl>
+                                          <p:spTgt spid="11"/>
+                                        </p:tgtEl>
+                                        <p:attrNameLst>
+                                          <p:attrName>ppt_x</p:attrName>
+                                        </p:attrNameLst>
+                                      </p:cBhvr>
+                                      <p:tavLst>
+                                        <p:tav tm="0">
+                                          <p:val>
+                                            <p:strVal val="#ppt_x"/>
+                                          </p:val>
+                                        </p:tav>
+                                        <p:tav tm="100000">
+                                          <p:val>
+                                            <p:strVal val="#ppt_x"/>
+                                          </p:val>
+                                        </p:tav>
+                                      </p:tavLst>
+                                    </p:anim>
+                                    <p:anim calcmode="lin" valueType="num">
+                                      <p:cBhvr additive="base">
+                                        <p:cTn id="23" dur="500" fill="hold"/>
+                                        <p:tgtEl>
+                                          <p:spTgt spid="11"/>
+                                        </p:tgtEl>
+                                        <p:attrNameLst>
+                                          <p:attrName>ppt_y</p:attrName>
+                                        </p:attrNameLst>
+                                      </p:cBhvr>
+                                      <p:tavLst>
+                                        <p:tav tm="0">
+                                          <p:val>
+                                            <p:strVal val="1+#ppt_h/2"/>
+                                          </p:val>
+                                        </p:tav>
+                                        <p:tav tm="100000">
+                                          <p:val>
+                                            <p:strVal val="#ppt_y"/>
+                                          </p:val>
+                                        </p:tav>
+                                      </p:tavLst>
+                                    </p:anim>
+                                  </p:childTnLst>
+                                </p:cTn>
+                              </p:par>
+                            </p:childTnLst>
+                          </p:cTn>
+                        </p:par>
+                        <p:par>
+                          <p:cTn id="24" fill="hold">
+                            <p:stCondLst>
+                              <p:cond delay="3500"/>
+                            </p:stCondLst>
+                            <p:childTnLst>
+                              <p:par>
+                                <p:cTn id="25" presetID="2" presetClass="entr" presetSubtype="4" fill="hold" nodeType="afterEffect">
+                                  <p:stCondLst>
+                                    <p:cond delay="500"/>
+                                  </p:stCondLst>
+                                  <p:childTnLst>
+                                    <p:set>
+                                      <p:cBhvr>
+                                        <p:cTn id="26" dur="1" fill="hold">
+                                          <p:stCondLst>
+                                            <p:cond delay="0"/>
+                                          </p:stCondLst>
+                                        </p:cTn>
+                                        <p:tgtEl>
+                                          <p:spTgt spid="9"/>
+                                        </p:tgtEl>
+                                        <p:attrNameLst>
+                                          <p:attrName>style.visibility</p:attrName>
+                                        </p:attrNameLst>
+                                      </p:cBhvr>
+                                      <p:to>
+                                        <p:strVal val="visible"/>
+                                      </p:to>
+                                    </p:set>
+                                    <p:anim calcmode="lin" valueType="num">
+                                      <p:cBhvr additive="base">
+                                        <p:cTn id="27" dur="500" fill="hold"/>
+                                        <p:tgtEl>
+                                          <p:spTgt spid="9"/>
+                                        </p:tgtEl>
+                                        <p:attrNameLst>
+                                          <p:attrName>ppt_x</p:attrName>
+                                        </p:attrNameLst>
+                                      </p:cBhvr>
+                                      <p:tavLst>
+                                        <p:tav tm="0">
+                                          <p:val>
+                                            <p:strVal val="#ppt_x"/>
+                                          </p:val>
+                                        </p:tav>
+                                        <p:tav tm="100000">
+                                          <p:val>
+                                            <p:strVal val="#ppt_x"/>
+                                          </p:val>
+                                        </p:tav>
+                                      </p:tavLst>
+                                    </p:anim>
+                                    <p:anim calcmode="lin" valueType="num">
+                                      <p:cBhvr additive="base">
+                                        <p:cTn id="28" dur="500" fill="hold"/>
+                                        <p:tgtEl>
+                                          <p:spTgt spid="9"/>
+                                        </p:tgtEl>
+                                        <p:attrNameLst>
+                                          <p:attrName>ppt_y</p:attrName>
+                                        </p:attrNameLst>
+                                      </p:cBhvr>
+                                      <p:tavLst>
+                                        <p:tav tm="0">
+                                          <p:val>
+                                            <p:strVal val="1+#ppt_h/2"/>
+                                          </p:val>
+                                        </p:tav>
+                                        <p:tav tm="100000">
+                                          <p:val>
+                                            <p:strVal val="#ppt_y"/>
+                                          </p:val>
+                                        </p:tav>
+                                      </p:tavLst>
+                                    </p:anim>
+                                  </p:childTnLst>
+                                </p:cTn>
+                              </p:par>
+                            </p:childTnLst>
+                          </p:cTn>
+                        </p:par>
+                      </p:childTnLst>
+                    </p:cTn>
+                  </p:par>
+                </p:childTnLst>
+              </p:cTn>
+              <p:prevCondLst>
+                <p:cond evt="onPrev" delay="0">
+                  <p:tgtEl>
+                    <p:sldTgt/>
+                  </p:tgtEl>
+                </p:cond>
+              </p:prevCondLst>
+              <p:nextCondLst>
+                <p:cond evt="onNext" delay="0">
+                  <p:tgtEl>
+                    <p:sldTgt/>
+                  </p:tgtEl>
+                </p:cond>
+              </p:nextCondLst>
+            </p:seq>
+          </p:childTnLst>
+        </p:cTn>
+      </p:par>
+    </p:tnLst>
+  </p:timing>
 </p:sld>
 </file>
 
-<file path=ppt/slides/slide3.xml><?xml version="1.0" encoding="utf-8"?>
+<file path=ppt/slides/slide2.xml><?xml version="1.0" encoding="utf-8"?>
 <p:sld xmlns:a="http://schemas.openxmlformats.org/drawingml/2006/main" xmlns:r="http://schemas.openxmlformats.org/officeDocument/2006/relationships" xmlns:p="http://schemas.openxmlformats.org/presentationml/2006/main">
   <p:cSld>
     <p:bg>
@@ -3897,7 +4228,7 @@
 </p:sld>
 </file>
 
-<file path=ppt/slides/slide4.xml><?xml version="1.0" encoding="utf-8"?>
+<file path=ppt/slides/slide3.xml><?xml version="1.0" encoding="utf-8"?>
 <p:sld xmlns:a="http://schemas.openxmlformats.org/drawingml/2006/main" xmlns:r="http://schemas.openxmlformats.org/officeDocument/2006/relationships" xmlns:p="http://schemas.openxmlformats.org/presentationml/2006/main">
   <p:cSld>
     <p:bg>
@@ -4177,6 +4508,424 @@
           </a:p>
         </p:txBody>
       </p:sp>
+      <p:sp>
+        <p:nvSpPr>
+          <p:cNvPr id="4" name="Téglalap 3">
+            <a:extLst>
+              <a:ext uri="{FF2B5EF4-FFF2-40B4-BE49-F238E27FC236}">
+                <a16:creationId xmlns:a16="http://schemas.microsoft.com/office/drawing/2014/main" id="{F83C45B3-17FB-4EDA-6161-CE9ED34EAD1A}"/>
+              </a:ext>
+            </a:extLst>
+          </p:cNvPr>
+          <p:cNvSpPr/>
+          <p:nvPr/>
+        </p:nvSpPr>
+        <p:spPr>
+          <a:xfrm>
+            <a:off x="5760244" y="3060000"/>
+            <a:ext cx="4521600" cy="1440000"/>
+          </a:xfrm>
+          <a:prstGeom prst="rect">
+            <a:avLst/>
+          </a:prstGeom>
+          <a:noFill/>
+          <a:ln w="25400">
+            <a:solidFill>
+              <a:schemeClr val="tx1"/>
+            </a:solidFill>
+          </a:ln>
+        </p:spPr>
+        <p:style>
+          <a:lnRef idx="2">
+            <a:schemeClr val="accent1">
+              <a:shade val="15000"/>
+            </a:schemeClr>
+          </a:lnRef>
+          <a:fillRef idx="1">
+            <a:schemeClr val="accent1"/>
+          </a:fillRef>
+          <a:effectRef idx="0">
+            <a:schemeClr val="accent1"/>
+          </a:effectRef>
+          <a:fontRef idx="minor">
+            <a:schemeClr val="lt1"/>
+          </a:fontRef>
+        </p:style>
+        <p:txBody>
+          <a:bodyPr rtlCol="0" anchor="ctr"/>
+          <a:lstStyle/>
+          <a:p>
+            <a:pPr algn="ctr"/>
+            <a:endParaRPr lang="hu-HU"/>
+          </a:p>
+        </p:txBody>
+      </p:sp>
+      <p:sp>
+        <p:nvSpPr>
+          <p:cNvPr id="7" name="Ellipszis 6">
+            <a:extLst>
+              <a:ext uri="{FF2B5EF4-FFF2-40B4-BE49-F238E27FC236}">
+                <a16:creationId xmlns:a16="http://schemas.microsoft.com/office/drawing/2014/main" id="{B3280F0A-69B4-131E-2901-20BB9F16174F}"/>
+              </a:ext>
+            </a:extLst>
+          </p:cNvPr>
+          <p:cNvSpPr/>
+          <p:nvPr/>
+        </p:nvSpPr>
+        <p:spPr>
+          <a:xfrm>
+            <a:off x="8534400" y="1620000"/>
+            <a:ext cx="1440000" cy="1440000"/>
+          </a:xfrm>
+          <a:prstGeom prst="ellipse">
+            <a:avLst/>
+          </a:prstGeom>
+          <a:noFill/>
+          <a:ln w="25400">
+            <a:solidFill>
+              <a:schemeClr val="tx1"/>
+            </a:solidFill>
+          </a:ln>
+        </p:spPr>
+        <p:style>
+          <a:lnRef idx="2">
+            <a:schemeClr val="accent1">
+              <a:shade val="15000"/>
+            </a:schemeClr>
+          </a:lnRef>
+          <a:fillRef idx="1">
+            <a:schemeClr val="accent1"/>
+          </a:fillRef>
+          <a:effectRef idx="0">
+            <a:schemeClr val="accent1"/>
+          </a:effectRef>
+          <a:fontRef idx="minor">
+            <a:schemeClr val="lt1"/>
+          </a:fontRef>
+        </p:style>
+        <p:txBody>
+          <a:bodyPr rtlCol="0" anchor="ctr"/>
+          <a:lstStyle/>
+          <a:p>
+            <a:pPr algn="ctr"/>
+            <a:endParaRPr lang="hu-HU"/>
+          </a:p>
+        </p:txBody>
+      </p:sp>
+      <p:cxnSp>
+        <p:nvCxnSpPr>
+          <p:cNvPr id="9" name="Egyenes összekötő 8">
+            <a:extLst>
+              <a:ext uri="{FF2B5EF4-FFF2-40B4-BE49-F238E27FC236}">
+                <a16:creationId xmlns:a16="http://schemas.microsoft.com/office/drawing/2014/main" id="{A8FCAF8C-824C-FB5F-F0EE-1A6E1D966E16}"/>
+              </a:ext>
+            </a:extLst>
+          </p:cNvPr>
+          <p:cNvCxnSpPr/>
+          <p:nvPr/>
+        </p:nvCxnSpPr>
+        <p:spPr>
+          <a:xfrm>
+            <a:off x="9254400" y="2340000"/>
+            <a:ext cx="720000" cy="0"/>
+          </a:xfrm>
+          <a:prstGeom prst="line">
+            <a:avLst/>
+          </a:prstGeom>
+          <a:ln w="25400">
+            <a:solidFill>
+              <a:schemeClr val="tx1"/>
+            </a:solidFill>
+            <a:prstDash val="dash"/>
+          </a:ln>
+        </p:spPr>
+        <p:style>
+          <a:lnRef idx="1">
+            <a:schemeClr val="accent1"/>
+          </a:lnRef>
+          <a:fillRef idx="0">
+            <a:schemeClr val="accent1"/>
+          </a:fillRef>
+          <a:effectRef idx="0">
+            <a:schemeClr val="accent1"/>
+          </a:effectRef>
+          <a:fontRef idx="minor">
+            <a:schemeClr val="tx1"/>
+          </a:fontRef>
+        </p:style>
+      </p:cxnSp>
+      <p:sp>
+        <p:nvSpPr>
+          <p:cNvPr id="12" name="Szövegdoboz 11">
+            <a:extLst>
+              <a:ext uri="{FF2B5EF4-FFF2-40B4-BE49-F238E27FC236}">
+                <a16:creationId xmlns:a16="http://schemas.microsoft.com/office/drawing/2014/main" id="{4BBFD8F6-CBAC-8060-FA79-E90469B45949}"/>
+              </a:ext>
+            </a:extLst>
+          </p:cNvPr>
+          <p:cNvSpPr txBox="1"/>
+          <p:nvPr/>
+        </p:nvSpPr>
+        <p:spPr>
+          <a:xfrm>
+            <a:off x="6450741" y="2613724"/>
+            <a:ext cx="903136" cy="446276"/>
+          </a:xfrm>
+          <a:prstGeom prst="rect">
+            <a:avLst/>
+          </a:prstGeom>
+          <a:noFill/>
+        </p:spPr>
+        <p:txBody>
+          <a:bodyPr wrap="square" rtlCol="0">
+            <a:spAutoFit/>
+          </a:bodyPr>
+          <a:lstStyle/>
+          <a:p>
+            <a:pPr algn="ctr"/>
+            <a:r>
+              <a:rPr lang="hu-HU" sz="2300" dirty="0">
+                <a:latin typeface="Times New Roman" panose="02020603050405020304" pitchFamily="18" charset="0"/>
+                <a:cs typeface="Times New Roman" panose="02020603050405020304" pitchFamily="18" charset="0"/>
+              </a:rPr>
+              <a:t>2r</a:t>
+            </a:r>
+            <a:r>
+              <a:rPr lang="el-GR" sz="2300" dirty="0">
+                <a:latin typeface="Times New Roman" panose="02020603050405020304" pitchFamily="18" charset="0"/>
+                <a:cs typeface="Times New Roman" panose="02020603050405020304" pitchFamily="18" charset="0"/>
+              </a:rPr>
+              <a:t>π</a:t>
+            </a:r>
+            <a:endParaRPr lang="hu-HU" sz="2300" dirty="0">
+              <a:latin typeface="Times New Roman" panose="02020603050405020304" pitchFamily="18" charset="0"/>
+              <a:cs typeface="Times New Roman" panose="02020603050405020304" pitchFamily="18" charset="0"/>
+            </a:endParaRPr>
+          </a:p>
+        </p:txBody>
+      </p:sp>
+      <p:sp>
+        <p:nvSpPr>
+          <p:cNvPr id="13" name="Szövegdoboz 12">
+            <a:extLst>
+              <a:ext uri="{FF2B5EF4-FFF2-40B4-BE49-F238E27FC236}">
+                <a16:creationId xmlns:a16="http://schemas.microsoft.com/office/drawing/2014/main" id="{4316377B-0287-914B-4DE7-6EB56C60783A}"/>
+              </a:ext>
+            </a:extLst>
+          </p:cNvPr>
+          <p:cNvSpPr txBox="1"/>
+          <p:nvPr/>
+        </p:nvSpPr>
+        <p:spPr>
+          <a:xfrm>
+            <a:off x="6450741" y="4018293"/>
+            <a:ext cx="903136" cy="446276"/>
+          </a:xfrm>
+          <a:prstGeom prst="rect">
+            <a:avLst/>
+          </a:prstGeom>
+          <a:noFill/>
+        </p:spPr>
+        <p:txBody>
+          <a:bodyPr wrap="square" rtlCol="0">
+            <a:spAutoFit/>
+          </a:bodyPr>
+          <a:lstStyle/>
+          <a:p>
+            <a:pPr algn="ctr"/>
+            <a:r>
+              <a:rPr lang="hu-HU" sz="2300" dirty="0">
+                <a:latin typeface="Times New Roman" panose="02020603050405020304" pitchFamily="18" charset="0"/>
+                <a:cs typeface="Times New Roman" panose="02020603050405020304" pitchFamily="18" charset="0"/>
+              </a:rPr>
+              <a:t>2r</a:t>
+            </a:r>
+            <a:r>
+              <a:rPr lang="el-GR" sz="2300" dirty="0">
+                <a:latin typeface="Times New Roman" panose="02020603050405020304" pitchFamily="18" charset="0"/>
+                <a:cs typeface="Times New Roman" panose="02020603050405020304" pitchFamily="18" charset="0"/>
+              </a:rPr>
+              <a:t>π</a:t>
+            </a:r>
+            <a:endParaRPr lang="hu-HU" sz="2300" dirty="0">
+              <a:latin typeface="Times New Roman" panose="02020603050405020304" pitchFamily="18" charset="0"/>
+              <a:cs typeface="Times New Roman" panose="02020603050405020304" pitchFamily="18" charset="0"/>
+            </a:endParaRPr>
+          </a:p>
+        </p:txBody>
+      </p:sp>
+      <p:sp>
+        <p:nvSpPr>
+          <p:cNvPr id="14" name="Szövegdoboz 13">
+            <a:extLst>
+              <a:ext uri="{FF2B5EF4-FFF2-40B4-BE49-F238E27FC236}">
+                <a16:creationId xmlns:a16="http://schemas.microsoft.com/office/drawing/2014/main" id="{CF6A83B9-8982-2F85-C1EB-96B6DFD58CD2}"/>
+              </a:ext>
+            </a:extLst>
+          </p:cNvPr>
+          <p:cNvSpPr txBox="1"/>
+          <p:nvPr/>
+        </p:nvSpPr>
+        <p:spPr>
+          <a:xfrm>
+            <a:off x="9458216" y="1905595"/>
+            <a:ext cx="312368" cy="446276"/>
+          </a:xfrm>
+          <a:prstGeom prst="rect">
+            <a:avLst/>
+          </a:prstGeom>
+          <a:noFill/>
+        </p:spPr>
+        <p:txBody>
+          <a:bodyPr wrap="square" rtlCol="0">
+            <a:spAutoFit/>
+          </a:bodyPr>
+          <a:lstStyle/>
+          <a:p>
+            <a:pPr algn="ctr"/>
+            <a:r>
+              <a:rPr lang="hu-HU" sz="2300" dirty="0">
+                <a:latin typeface="Times New Roman" panose="02020603050405020304" pitchFamily="18" charset="0"/>
+                <a:cs typeface="Times New Roman" panose="02020603050405020304" pitchFamily="18" charset="0"/>
+              </a:rPr>
+              <a:t>r</a:t>
+            </a:r>
+          </a:p>
+        </p:txBody>
+      </p:sp>
+      <p:sp>
+        <p:nvSpPr>
+          <p:cNvPr id="15" name="Ellipszis 14">
+            <a:extLst>
+              <a:ext uri="{FF2B5EF4-FFF2-40B4-BE49-F238E27FC236}">
+                <a16:creationId xmlns:a16="http://schemas.microsoft.com/office/drawing/2014/main" id="{42786DB5-F074-2C26-FE81-E44404746FEA}"/>
+              </a:ext>
+            </a:extLst>
+          </p:cNvPr>
+          <p:cNvSpPr/>
+          <p:nvPr/>
+        </p:nvSpPr>
+        <p:spPr>
+          <a:xfrm>
+            <a:off x="8521700" y="4524185"/>
+            <a:ext cx="1440000" cy="1440000"/>
+          </a:xfrm>
+          <a:prstGeom prst="ellipse">
+            <a:avLst/>
+          </a:prstGeom>
+          <a:noFill/>
+          <a:ln w="25400">
+            <a:solidFill>
+              <a:schemeClr val="tx1"/>
+            </a:solidFill>
+          </a:ln>
+        </p:spPr>
+        <p:style>
+          <a:lnRef idx="2">
+            <a:schemeClr val="accent1">
+              <a:shade val="15000"/>
+            </a:schemeClr>
+          </a:lnRef>
+          <a:fillRef idx="1">
+            <a:schemeClr val="accent1"/>
+          </a:fillRef>
+          <a:effectRef idx="0">
+            <a:schemeClr val="accent1"/>
+          </a:effectRef>
+          <a:fontRef idx="minor">
+            <a:schemeClr val="lt1"/>
+          </a:fontRef>
+        </p:style>
+        <p:txBody>
+          <a:bodyPr rtlCol="0" anchor="ctr"/>
+          <a:lstStyle/>
+          <a:p>
+            <a:pPr algn="ctr"/>
+            <a:endParaRPr lang="hu-HU"/>
+          </a:p>
+        </p:txBody>
+      </p:sp>
+      <p:cxnSp>
+        <p:nvCxnSpPr>
+          <p:cNvPr id="16" name="Egyenes összekötő 15">
+            <a:extLst>
+              <a:ext uri="{FF2B5EF4-FFF2-40B4-BE49-F238E27FC236}">
+                <a16:creationId xmlns:a16="http://schemas.microsoft.com/office/drawing/2014/main" id="{F25CB387-3C7C-E64E-C53F-F56A0436C5B2}"/>
+              </a:ext>
+            </a:extLst>
+          </p:cNvPr>
+          <p:cNvCxnSpPr/>
+          <p:nvPr/>
+        </p:nvCxnSpPr>
+        <p:spPr>
+          <a:xfrm>
+            <a:off x="9241700" y="5244185"/>
+            <a:ext cx="720000" cy="0"/>
+          </a:xfrm>
+          <a:prstGeom prst="line">
+            <a:avLst/>
+          </a:prstGeom>
+          <a:ln w="25400">
+            <a:solidFill>
+              <a:schemeClr val="tx1"/>
+            </a:solidFill>
+            <a:prstDash val="dash"/>
+          </a:ln>
+        </p:spPr>
+        <p:style>
+          <a:lnRef idx="1">
+            <a:schemeClr val="accent1"/>
+          </a:lnRef>
+          <a:fillRef idx="0">
+            <a:schemeClr val="accent1"/>
+          </a:fillRef>
+          <a:effectRef idx="0">
+            <a:schemeClr val="accent1"/>
+          </a:effectRef>
+          <a:fontRef idx="minor">
+            <a:schemeClr val="tx1"/>
+          </a:fontRef>
+        </p:style>
+      </p:cxnSp>
+      <p:sp>
+        <p:nvSpPr>
+          <p:cNvPr id="17" name="Szövegdoboz 16">
+            <a:extLst>
+              <a:ext uri="{FF2B5EF4-FFF2-40B4-BE49-F238E27FC236}">
+                <a16:creationId xmlns:a16="http://schemas.microsoft.com/office/drawing/2014/main" id="{94614967-EF93-6D68-E413-D4482108E226}"/>
+              </a:ext>
+            </a:extLst>
+          </p:cNvPr>
+          <p:cNvSpPr txBox="1"/>
+          <p:nvPr/>
+        </p:nvSpPr>
+        <p:spPr>
+          <a:xfrm>
+            <a:off x="9445516" y="4809780"/>
+            <a:ext cx="312368" cy="446276"/>
+          </a:xfrm>
+          <a:prstGeom prst="rect">
+            <a:avLst/>
+          </a:prstGeom>
+          <a:noFill/>
+        </p:spPr>
+        <p:txBody>
+          <a:bodyPr wrap="square" rtlCol="0">
+            <a:spAutoFit/>
+          </a:bodyPr>
+          <a:lstStyle/>
+          <a:p>
+            <a:pPr algn="ctr"/>
+            <a:r>
+              <a:rPr lang="hu-HU" sz="2300" dirty="0">
+                <a:latin typeface="Times New Roman" panose="02020603050405020304" pitchFamily="18" charset="0"/>
+                <a:cs typeface="Times New Roman" panose="02020603050405020304" pitchFamily="18" charset="0"/>
+              </a:rPr>
+              <a:t>r</a:t>
+            </a:r>
+          </a:p>
+        </p:txBody>
+      </p:sp>
     </p:spTree>
     <p:extLst>
       <p:ext uri="{BB962C8B-B14F-4D97-AF65-F5344CB8AC3E}">
@@ -4187,6 +4936,2957 @@
   <p:clrMapOvr>
     <a:masterClrMapping/>
   </p:clrMapOvr>
+</p:sld>
+</file>
+
+<file path=ppt/slides/slide4.xml><?xml version="1.0" encoding="utf-8"?>
+<p:sld xmlns:a="http://schemas.openxmlformats.org/drawingml/2006/main" xmlns:r="http://schemas.openxmlformats.org/officeDocument/2006/relationships" xmlns:p="http://schemas.openxmlformats.org/presentationml/2006/main">
+  <p:cSld>
+    <p:bg>
+      <p:bgPr>
+        <a:gradFill flip="none" rotWithShape="1">
+          <a:gsLst>
+            <a:gs pos="0">
+              <a:schemeClr val="accent1">
+                <a:lumMod val="5000"/>
+                <a:lumOff val="95000"/>
+              </a:schemeClr>
+            </a:gs>
+            <a:gs pos="100000">
+              <a:srgbClr val="819839"/>
+            </a:gs>
+          </a:gsLst>
+          <a:path path="circle">
+            <a:fillToRect l="50000" t="50000" r="50000" b="50000"/>
+          </a:path>
+          <a:tileRect/>
+        </a:gradFill>
+        <a:effectLst/>
+      </p:bgPr>
+    </p:bg>
+    <p:spTree>
+      <p:nvGrpSpPr>
+        <p:cNvPr id="1" name="">
+          <a:extLst>
+            <a:ext uri="{FF2B5EF4-FFF2-40B4-BE49-F238E27FC236}">
+              <a16:creationId xmlns:a16="http://schemas.microsoft.com/office/drawing/2014/main" id="{08FFC869-D40C-6E64-0C8D-C446A5781B24}"/>
+            </a:ext>
+          </a:extLst>
+        </p:cNvPr>
+        <p:cNvGrpSpPr/>
+        <p:nvPr/>
+      </p:nvGrpSpPr>
+      <p:grpSpPr>
+        <a:xfrm>
+          <a:off x="0" y="0"/>
+          <a:ext cx="0" cy="0"/>
+          <a:chOff x="0" y="0"/>
+          <a:chExt cx="0" cy="0"/>
+        </a:xfrm>
+      </p:grpSpPr>
+      <p:sp>
+        <p:nvSpPr>
+          <p:cNvPr id="25" name="Szabadkézi sokszög: alakzat 24">
+            <a:extLst>
+              <a:ext uri="{FF2B5EF4-FFF2-40B4-BE49-F238E27FC236}">
+                <a16:creationId xmlns:a16="http://schemas.microsoft.com/office/drawing/2014/main" id="{015C3D37-1DAD-A558-2385-2DA1842DF1FE}"/>
+              </a:ext>
+            </a:extLst>
+          </p:cNvPr>
+          <p:cNvSpPr/>
+          <p:nvPr/>
+        </p:nvSpPr>
+        <p:spPr>
+          <a:xfrm>
+            <a:off x="6831569" y="4331113"/>
+            <a:ext cx="2880000" cy="1440000"/>
+          </a:xfrm>
+          <a:custGeom>
+            <a:avLst/>
+            <a:gdLst>
+              <a:gd name="connsiteX0" fmla="*/ 785191 w 2753139"/>
+              <a:gd name="connsiteY0" fmla="*/ 0 h 1411356"/>
+              <a:gd name="connsiteX1" fmla="*/ 785191 w 2753139"/>
+              <a:gd name="connsiteY1" fmla="*/ 0 h 1411356"/>
+              <a:gd name="connsiteX2" fmla="*/ 556591 w 2753139"/>
+              <a:gd name="connsiteY2" fmla="*/ 59634 h 1411356"/>
+              <a:gd name="connsiteX3" fmla="*/ 457200 w 2753139"/>
+              <a:gd name="connsiteY3" fmla="*/ 89452 h 1411356"/>
+              <a:gd name="connsiteX4" fmla="*/ 347869 w 2753139"/>
+              <a:gd name="connsiteY4" fmla="*/ 159026 h 1411356"/>
+              <a:gd name="connsiteX5" fmla="*/ 298174 w 2753139"/>
+              <a:gd name="connsiteY5" fmla="*/ 188843 h 1411356"/>
+              <a:gd name="connsiteX6" fmla="*/ 258417 w 2753139"/>
+              <a:gd name="connsiteY6" fmla="*/ 218660 h 1411356"/>
+              <a:gd name="connsiteX7" fmla="*/ 208721 w 2753139"/>
+              <a:gd name="connsiteY7" fmla="*/ 238539 h 1411356"/>
+              <a:gd name="connsiteX8" fmla="*/ 159026 w 2753139"/>
+              <a:gd name="connsiteY8" fmla="*/ 288234 h 1411356"/>
+              <a:gd name="connsiteX9" fmla="*/ 89452 w 2753139"/>
+              <a:gd name="connsiteY9" fmla="*/ 337930 h 1411356"/>
+              <a:gd name="connsiteX10" fmla="*/ 59634 w 2753139"/>
+              <a:gd name="connsiteY10" fmla="*/ 387626 h 1411356"/>
+              <a:gd name="connsiteX11" fmla="*/ 9939 w 2753139"/>
+              <a:gd name="connsiteY11" fmla="*/ 496956 h 1411356"/>
+              <a:gd name="connsiteX12" fmla="*/ 0 w 2753139"/>
+              <a:gd name="connsiteY12" fmla="*/ 536713 h 1411356"/>
+              <a:gd name="connsiteX13" fmla="*/ 19878 w 2753139"/>
+              <a:gd name="connsiteY13" fmla="*/ 695739 h 1411356"/>
+              <a:gd name="connsiteX14" fmla="*/ 39756 w 2753139"/>
+              <a:gd name="connsiteY14" fmla="*/ 725556 h 1411356"/>
+              <a:gd name="connsiteX15" fmla="*/ 49695 w 2753139"/>
+              <a:gd name="connsiteY15" fmla="*/ 765313 h 1411356"/>
+              <a:gd name="connsiteX16" fmla="*/ 69574 w 2753139"/>
+              <a:gd name="connsiteY16" fmla="*/ 795130 h 1411356"/>
+              <a:gd name="connsiteX17" fmla="*/ 129208 w 2753139"/>
+              <a:gd name="connsiteY17" fmla="*/ 864704 h 1411356"/>
+              <a:gd name="connsiteX18" fmla="*/ 159026 w 2753139"/>
+              <a:gd name="connsiteY18" fmla="*/ 884582 h 1411356"/>
+              <a:gd name="connsiteX19" fmla="*/ 248478 w 2753139"/>
+              <a:gd name="connsiteY19" fmla="*/ 914400 h 1411356"/>
+              <a:gd name="connsiteX20" fmla="*/ 357808 w 2753139"/>
+              <a:gd name="connsiteY20" fmla="*/ 944217 h 1411356"/>
+              <a:gd name="connsiteX21" fmla="*/ 427382 w 2753139"/>
+              <a:gd name="connsiteY21" fmla="*/ 974034 h 1411356"/>
+              <a:gd name="connsiteX22" fmla="*/ 496956 w 2753139"/>
+              <a:gd name="connsiteY22" fmla="*/ 993913 h 1411356"/>
+              <a:gd name="connsiteX23" fmla="*/ 675860 w 2753139"/>
+              <a:gd name="connsiteY23" fmla="*/ 1033669 h 1411356"/>
+              <a:gd name="connsiteX24" fmla="*/ 745434 w 2753139"/>
+              <a:gd name="connsiteY24" fmla="*/ 1083365 h 1411356"/>
+              <a:gd name="connsiteX25" fmla="*/ 805069 w 2753139"/>
+              <a:gd name="connsiteY25" fmla="*/ 1143000 h 1411356"/>
+              <a:gd name="connsiteX26" fmla="*/ 844826 w 2753139"/>
+              <a:gd name="connsiteY26" fmla="*/ 1192695 h 1411356"/>
+              <a:gd name="connsiteX27" fmla="*/ 924339 w 2753139"/>
+              <a:gd name="connsiteY27" fmla="*/ 1292086 h 1411356"/>
+              <a:gd name="connsiteX28" fmla="*/ 954156 w 2753139"/>
+              <a:gd name="connsiteY28" fmla="*/ 1302026 h 1411356"/>
+              <a:gd name="connsiteX29" fmla="*/ 1083365 w 2753139"/>
+              <a:gd name="connsiteY29" fmla="*/ 1341782 h 1411356"/>
+              <a:gd name="connsiteX30" fmla="*/ 1133060 w 2753139"/>
+              <a:gd name="connsiteY30" fmla="*/ 1351721 h 1411356"/>
+              <a:gd name="connsiteX31" fmla="*/ 1162878 w 2753139"/>
+              <a:gd name="connsiteY31" fmla="*/ 1361660 h 1411356"/>
+              <a:gd name="connsiteX32" fmla="*/ 1282147 w 2753139"/>
+              <a:gd name="connsiteY32" fmla="*/ 1371600 h 1411356"/>
+              <a:gd name="connsiteX33" fmla="*/ 1341782 w 2753139"/>
+              <a:gd name="connsiteY33" fmla="*/ 1391478 h 1411356"/>
+              <a:gd name="connsiteX34" fmla="*/ 1451113 w 2753139"/>
+              <a:gd name="connsiteY34" fmla="*/ 1401417 h 1411356"/>
+              <a:gd name="connsiteX35" fmla="*/ 1490869 w 2753139"/>
+              <a:gd name="connsiteY35" fmla="*/ 1411356 h 1411356"/>
+              <a:gd name="connsiteX36" fmla="*/ 1958008 w 2753139"/>
+              <a:gd name="connsiteY36" fmla="*/ 1401417 h 1411356"/>
+              <a:gd name="connsiteX37" fmla="*/ 2017643 w 2753139"/>
+              <a:gd name="connsiteY37" fmla="*/ 1381539 h 1411356"/>
+              <a:gd name="connsiteX38" fmla="*/ 2057400 w 2753139"/>
+              <a:gd name="connsiteY38" fmla="*/ 1371600 h 1411356"/>
+              <a:gd name="connsiteX39" fmla="*/ 2117034 w 2753139"/>
+              <a:gd name="connsiteY39" fmla="*/ 1321904 h 1411356"/>
+              <a:gd name="connsiteX40" fmla="*/ 2166730 w 2753139"/>
+              <a:gd name="connsiteY40" fmla="*/ 1302026 h 1411356"/>
+              <a:gd name="connsiteX41" fmla="*/ 2196547 w 2753139"/>
+              <a:gd name="connsiteY41" fmla="*/ 1282147 h 1411356"/>
+              <a:gd name="connsiteX42" fmla="*/ 2276060 w 2753139"/>
+              <a:gd name="connsiteY42" fmla="*/ 1242391 h 1411356"/>
+              <a:gd name="connsiteX43" fmla="*/ 2315817 w 2753139"/>
+              <a:gd name="connsiteY43" fmla="*/ 1212573 h 1411356"/>
+              <a:gd name="connsiteX44" fmla="*/ 2365513 w 2753139"/>
+              <a:gd name="connsiteY44" fmla="*/ 1202634 h 1411356"/>
+              <a:gd name="connsiteX45" fmla="*/ 2395330 w 2753139"/>
+              <a:gd name="connsiteY45" fmla="*/ 1182756 h 1411356"/>
+              <a:gd name="connsiteX46" fmla="*/ 2504660 w 2753139"/>
+              <a:gd name="connsiteY46" fmla="*/ 1143000 h 1411356"/>
+              <a:gd name="connsiteX47" fmla="*/ 2594113 w 2753139"/>
+              <a:gd name="connsiteY47" fmla="*/ 1063486 h 1411356"/>
+              <a:gd name="connsiteX48" fmla="*/ 2633869 w 2753139"/>
+              <a:gd name="connsiteY48" fmla="*/ 983973 h 1411356"/>
+              <a:gd name="connsiteX49" fmla="*/ 2653747 w 2753139"/>
+              <a:gd name="connsiteY49" fmla="*/ 944217 h 1411356"/>
+              <a:gd name="connsiteX50" fmla="*/ 2663687 w 2753139"/>
+              <a:gd name="connsiteY50" fmla="*/ 904460 h 1411356"/>
+              <a:gd name="connsiteX51" fmla="*/ 2683565 w 2753139"/>
+              <a:gd name="connsiteY51" fmla="*/ 864704 h 1411356"/>
+              <a:gd name="connsiteX52" fmla="*/ 2713382 w 2753139"/>
+              <a:gd name="connsiteY52" fmla="*/ 785191 h 1411356"/>
+              <a:gd name="connsiteX53" fmla="*/ 2733260 w 2753139"/>
+              <a:gd name="connsiteY53" fmla="*/ 725556 h 1411356"/>
+              <a:gd name="connsiteX54" fmla="*/ 2753139 w 2753139"/>
+              <a:gd name="connsiteY54" fmla="*/ 646043 h 1411356"/>
+              <a:gd name="connsiteX55" fmla="*/ 2733260 w 2753139"/>
+              <a:gd name="connsiteY55" fmla="*/ 407504 h 1411356"/>
+              <a:gd name="connsiteX56" fmla="*/ 2713382 w 2753139"/>
+              <a:gd name="connsiteY56" fmla="*/ 357808 h 1411356"/>
+              <a:gd name="connsiteX57" fmla="*/ 2683565 w 2753139"/>
+              <a:gd name="connsiteY57" fmla="*/ 347869 h 1411356"/>
+              <a:gd name="connsiteX58" fmla="*/ 2474843 w 2753139"/>
+              <a:gd name="connsiteY58" fmla="*/ 327991 h 1411356"/>
+              <a:gd name="connsiteX59" fmla="*/ 2355574 w 2753139"/>
+              <a:gd name="connsiteY59" fmla="*/ 208721 h 1411356"/>
+              <a:gd name="connsiteX60" fmla="*/ 2256182 w 2753139"/>
+              <a:gd name="connsiteY60" fmla="*/ 69573 h 1411356"/>
+              <a:gd name="connsiteX61" fmla="*/ 2236304 w 2753139"/>
+              <a:gd name="connsiteY61" fmla="*/ 29817 h 1411356"/>
+              <a:gd name="connsiteX62" fmla="*/ 2166730 w 2753139"/>
+              <a:gd name="connsiteY62" fmla="*/ 0 h 1411356"/>
+              <a:gd name="connsiteX63" fmla="*/ 1699591 w 2753139"/>
+              <a:gd name="connsiteY63" fmla="*/ 9939 h 1411356"/>
+              <a:gd name="connsiteX64" fmla="*/ 1590260 w 2753139"/>
+              <a:gd name="connsiteY64" fmla="*/ 19878 h 1411356"/>
+              <a:gd name="connsiteX65" fmla="*/ 1461052 w 2753139"/>
+              <a:gd name="connsiteY65" fmla="*/ 69573 h 1411356"/>
+              <a:gd name="connsiteX66" fmla="*/ 1411356 w 2753139"/>
+              <a:gd name="connsiteY66" fmla="*/ 99391 h 1411356"/>
+              <a:gd name="connsiteX67" fmla="*/ 1371600 w 2753139"/>
+              <a:gd name="connsiteY67" fmla="*/ 109330 h 1411356"/>
+              <a:gd name="connsiteX68" fmla="*/ 1192695 w 2753139"/>
+              <a:gd name="connsiteY68" fmla="*/ 89452 h 1411356"/>
+              <a:gd name="connsiteX69" fmla="*/ 1023730 w 2753139"/>
+              <a:gd name="connsiteY69" fmla="*/ 59634 h 1411356"/>
+              <a:gd name="connsiteX70" fmla="*/ 874643 w 2753139"/>
+              <a:gd name="connsiteY70" fmla="*/ 29817 h 1411356"/>
+              <a:gd name="connsiteX71" fmla="*/ 785191 w 2753139"/>
+              <a:gd name="connsiteY71" fmla="*/ 0 h 1411356"/>
+            </a:gdLst>
+            <a:ahLst/>
+            <a:cxnLst>
+              <a:cxn ang="0">
+                <a:pos x="connsiteX0" y="connsiteY0"/>
+              </a:cxn>
+              <a:cxn ang="0">
+                <a:pos x="connsiteX1" y="connsiteY1"/>
+              </a:cxn>
+              <a:cxn ang="0">
+                <a:pos x="connsiteX2" y="connsiteY2"/>
+              </a:cxn>
+              <a:cxn ang="0">
+                <a:pos x="connsiteX3" y="connsiteY3"/>
+              </a:cxn>
+              <a:cxn ang="0">
+                <a:pos x="connsiteX4" y="connsiteY4"/>
+              </a:cxn>
+              <a:cxn ang="0">
+                <a:pos x="connsiteX5" y="connsiteY5"/>
+              </a:cxn>
+              <a:cxn ang="0">
+                <a:pos x="connsiteX6" y="connsiteY6"/>
+              </a:cxn>
+              <a:cxn ang="0">
+                <a:pos x="connsiteX7" y="connsiteY7"/>
+              </a:cxn>
+              <a:cxn ang="0">
+                <a:pos x="connsiteX8" y="connsiteY8"/>
+              </a:cxn>
+              <a:cxn ang="0">
+                <a:pos x="connsiteX9" y="connsiteY9"/>
+              </a:cxn>
+              <a:cxn ang="0">
+                <a:pos x="connsiteX10" y="connsiteY10"/>
+              </a:cxn>
+              <a:cxn ang="0">
+                <a:pos x="connsiteX11" y="connsiteY11"/>
+              </a:cxn>
+              <a:cxn ang="0">
+                <a:pos x="connsiteX12" y="connsiteY12"/>
+              </a:cxn>
+              <a:cxn ang="0">
+                <a:pos x="connsiteX13" y="connsiteY13"/>
+              </a:cxn>
+              <a:cxn ang="0">
+                <a:pos x="connsiteX14" y="connsiteY14"/>
+              </a:cxn>
+              <a:cxn ang="0">
+                <a:pos x="connsiteX15" y="connsiteY15"/>
+              </a:cxn>
+              <a:cxn ang="0">
+                <a:pos x="connsiteX16" y="connsiteY16"/>
+              </a:cxn>
+              <a:cxn ang="0">
+                <a:pos x="connsiteX17" y="connsiteY17"/>
+              </a:cxn>
+              <a:cxn ang="0">
+                <a:pos x="connsiteX18" y="connsiteY18"/>
+              </a:cxn>
+              <a:cxn ang="0">
+                <a:pos x="connsiteX19" y="connsiteY19"/>
+              </a:cxn>
+              <a:cxn ang="0">
+                <a:pos x="connsiteX20" y="connsiteY20"/>
+              </a:cxn>
+              <a:cxn ang="0">
+                <a:pos x="connsiteX21" y="connsiteY21"/>
+              </a:cxn>
+              <a:cxn ang="0">
+                <a:pos x="connsiteX22" y="connsiteY22"/>
+              </a:cxn>
+              <a:cxn ang="0">
+                <a:pos x="connsiteX23" y="connsiteY23"/>
+              </a:cxn>
+              <a:cxn ang="0">
+                <a:pos x="connsiteX24" y="connsiteY24"/>
+              </a:cxn>
+              <a:cxn ang="0">
+                <a:pos x="connsiteX25" y="connsiteY25"/>
+              </a:cxn>
+              <a:cxn ang="0">
+                <a:pos x="connsiteX26" y="connsiteY26"/>
+              </a:cxn>
+              <a:cxn ang="0">
+                <a:pos x="connsiteX27" y="connsiteY27"/>
+              </a:cxn>
+              <a:cxn ang="0">
+                <a:pos x="connsiteX28" y="connsiteY28"/>
+              </a:cxn>
+              <a:cxn ang="0">
+                <a:pos x="connsiteX29" y="connsiteY29"/>
+              </a:cxn>
+              <a:cxn ang="0">
+                <a:pos x="connsiteX30" y="connsiteY30"/>
+              </a:cxn>
+              <a:cxn ang="0">
+                <a:pos x="connsiteX31" y="connsiteY31"/>
+              </a:cxn>
+              <a:cxn ang="0">
+                <a:pos x="connsiteX32" y="connsiteY32"/>
+              </a:cxn>
+              <a:cxn ang="0">
+                <a:pos x="connsiteX33" y="connsiteY33"/>
+              </a:cxn>
+              <a:cxn ang="0">
+                <a:pos x="connsiteX34" y="connsiteY34"/>
+              </a:cxn>
+              <a:cxn ang="0">
+                <a:pos x="connsiteX35" y="connsiteY35"/>
+              </a:cxn>
+              <a:cxn ang="0">
+                <a:pos x="connsiteX36" y="connsiteY36"/>
+              </a:cxn>
+              <a:cxn ang="0">
+                <a:pos x="connsiteX37" y="connsiteY37"/>
+              </a:cxn>
+              <a:cxn ang="0">
+                <a:pos x="connsiteX38" y="connsiteY38"/>
+              </a:cxn>
+              <a:cxn ang="0">
+                <a:pos x="connsiteX39" y="connsiteY39"/>
+              </a:cxn>
+              <a:cxn ang="0">
+                <a:pos x="connsiteX40" y="connsiteY40"/>
+              </a:cxn>
+              <a:cxn ang="0">
+                <a:pos x="connsiteX41" y="connsiteY41"/>
+              </a:cxn>
+              <a:cxn ang="0">
+                <a:pos x="connsiteX42" y="connsiteY42"/>
+              </a:cxn>
+              <a:cxn ang="0">
+                <a:pos x="connsiteX43" y="connsiteY43"/>
+              </a:cxn>
+              <a:cxn ang="0">
+                <a:pos x="connsiteX44" y="connsiteY44"/>
+              </a:cxn>
+              <a:cxn ang="0">
+                <a:pos x="connsiteX45" y="connsiteY45"/>
+              </a:cxn>
+              <a:cxn ang="0">
+                <a:pos x="connsiteX46" y="connsiteY46"/>
+              </a:cxn>
+              <a:cxn ang="0">
+                <a:pos x="connsiteX47" y="connsiteY47"/>
+              </a:cxn>
+              <a:cxn ang="0">
+                <a:pos x="connsiteX48" y="connsiteY48"/>
+              </a:cxn>
+              <a:cxn ang="0">
+                <a:pos x="connsiteX49" y="connsiteY49"/>
+              </a:cxn>
+              <a:cxn ang="0">
+                <a:pos x="connsiteX50" y="connsiteY50"/>
+              </a:cxn>
+              <a:cxn ang="0">
+                <a:pos x="connsiteX51" y="connsiteY51"/>
+              </a:cxn>
+              <a:cxn ang="0">
+                <a:pos x="connsiteX52" y="connsiteY52"/>
+              </a:cxn>
+              <a:cxn ang="0">
+                <a:pos x="connsiteX53" y="connsiteY53"/>
+              </a:cxn>
+              <a:cxn ang="0">
+                <a:pos x="connsiteX54" y="connsiteY54"/>
+              </a:cxn>
+              <a:cxn ang="0">
+                <a:pos x="connsiteX55" y="connsiteY55"/>
+              </a:cxn>
+              <a:cxn ang="0">
+                <a:pos x="connsiteX56" y="connsiteY56"/>
+              </a:cxn>
+              <a:cxn ang="0">
+                <a:pos x="connsiteX57" y="connsiteY57"/>
+              </a:cxn>
+              <a:cxn ang="0">
+                <a:pos x="connsiteX58" y="connsiteY58"/>
+              </a:cxn>
+              <a:cxn ang="0">
+                <a:pos x="connsiteX59" y="connsiteY59"/>
+              </a:cxn>
+              <a:cxn ang="0">
+                <a:pos x="connsiteX60" y="connsiteY60"/>
+              </a:cxn>
+              <a:cxn ang="0">
+                <a:pos x="connsiteX61" y="connsiteY61"/>
+              </a:cxn>
+              <a:cxn ang="0">
+                <a:pos x="connsiteX62" y="connsiteY62"/>
+              </a:cxn>
+              <a:cxn ang="0">
+                <a:pos x="connsiteX63" y="connsiteY63"/>
+              </a:cxn>
+              <a:cxn ang="0">
+                <a:pos x="connsiteX64" y="connsiteY64"/>
+              </a:cxn>
+              <a:cxn ang="0">
+                <a:pos x="connsiteX65" y="connsiteY65"/>
+              </a:cxn>
+              <a:cxn ang="0">
+                <a:pos x="connsiteX66" y="connsiteY66"/>
+              </a:cxn>
+              <a:cxn ang="0">
+                <a:pos x="connsiteX67" y="connsiteY67"/>
+              </a:cxn>
+              <a:cxn ang="0">
+                <a:pos x="connsiteX68" y="connsiteY68"/>
+              </a:cxn>
+              <a:cxn ang="0">
+                <a:pos x="connsiteX69" y="connsiteY69"/>
+              </a:cxn>
+              <a:cxn ang="0">
+                <a:pos x="connsiteX70" y="connsiteY70"/>
+              </a:cxn>
+              <a:cxn ang="0">
+                <a:pos x="connsiteX71" y="connsiteY71"/>
+              </a:cxn>
+            </a:cxnLst>
+            <a:rect l="l" t="t" r="r" b="b"/>
+            <a:pathLst>
+              <a:path w="2753139" h="1411356">
+                <a:moveTo>
+                  <a:pt x="785191" y="0"/>
+                </a:moveTo>
+                <a:lnTo>
+                  <a:pt x="785191" y="0"/>
+                </a:lnTo>
+                <a:lnTo>
+                  <a:pt x="556591" y="59634"/>
+                </a:lnTo>
+                <a:cubicBezTo>
+                  <a:pt x="523221" y="68735"/>
+                  <a:pt x="488429" y="74581"/>
+                  <a:pt x="457200" y="89452"/>
+                </a:cubicBezTo>
+                <a:cubicBezTo>
+                  <a:pt x="418199" y="108024"/>
+                  <a:pt x="384500" y="136132"/>
+                  <a:pt x="347869" y="159026"/>
+                </a:cubicBezTo>
+                <a:cubicBezTo>
+                  <a:pt x="331487" y="169264"/>
+                  <a:pt x="313628" y="177252"/>
+                  <a:pt x="298174" y="188843"/>
+                </a:cubicBezTo>
+                <a:cubicBezTo>
+                  <a:pt x="284922" y="198782"/>
+                  <a:pt x="272898" y="210615"/>
+                  <a:pt x="258417" y="218660"/>
+                </a:cubicBezTo>
+                <a:cubicBezTo>
+                  <a:pt x="242821" y="227325"/>
+                  <a:pt x="225286" y="231913"/>
+                  <a:pt x="208721" y="238539"/>
+                </a:cubicBezTo>
+                <a:cubicBezTo>
+                  <a:pt x="192156" y="255104"/>
+                  <a:pt x="177518" y="273852"/>
+                  <a:pt x="159026" y="288234"/>
+                </a:cubicBezTo>
+                <a:cubicBezTo>
+                  <a:pt x="106018" y="329463"/>
+                  <a:pt x="130390" y="283346"/>
+                  <a:pt x="89452" y="337930"/>
+                </a:cubicBezTo>
+                <a:cubicBezTo>
+                  <a:pt x="77861" y="353385"/>
+                  <a:pt x="68793" y="370617"/>
+                  <a:pt x="59634" y="387626"/>
+                </a:cubicBezTo>
+                <a:cubicBezTo>
+                  <a:pt x="35681" y="432110"/>
+                  <a:pt x="22005" y="454725"/>
+                  <a:pt x="9939" y="496956"/>
+                </a:cubicBezTo>
+                <a:cubicBezTo>
+                  <a:pt x="6186" y="510091"/>
+                  <a:pt x="3313" y="523461"/>
+                  <a:pt x="0" y="536713"/>
+                </a:cubicBezTo>
+                <a:cubicBezTo>
+                  <a:pt x="1197" y="551072"/>
+                  <a:pt x="3645" y="657862"/>
+                  <a:pt x="19878" y="695739"/>
+                </a:cubicBezTo>
+                <a:cubicBezTo>
+                  <a:pt x="24583" y="706718"/>
+                  <a:pt x="33130" y="715617"/>
+                  <a:pt x="39756" y="725556"/>
+                </a:cubicBezTo>
+                <a:cubicBezTo>
+                  <a:pt x="43069" y="738808"/>
+                  <a:pt x="44314" y="752757"/>
+                  <a:pt x="49695" y="765313"/>
+                </a:cubicBezTo>
+                <a:cubicBezTo>
+                  <a:pt x="54401" y="776293"/>
+                  <a:pt x="62631" y="785410"/>
+                  <a:pt x="69574" y="795130"/>
+                </a:cubicBezTo>
+                <a:cubicBezTo>
+                  <a:pt x="88928" y="822225"/>
+                  <a:pt x="103713" y="843458"/>
+                  <a:pt x="129208" y="864704"/>
+                </a:cubicBezTo>
+                <a:cubicBezTo>
+                  <a:pt x="138385" y="872351"/>
+                  <a:pt x="147999" y="879988"/>
+                  <a:pt x="159026" y="884582"/>
+                </a:cubicBezTo>
+                <a:cubicBezTo>
+                  <a:pt x="188039" y="896671"/>
+                  <a:pt x="222326" y="896966"/>
+                  <a:pt x="248478" y="914400"/>
+                </a:cubicBezTo>
+                <a:cubicBezTo>
+                  <a:pt x="300520" y="949094"/>
+                  <a:pt x="266442" y="932796"/>
+                  <a:pt x="357808" y="944217"/>
+                </a:cubicBezTo>
+                <a:cubicBezTo>
+                  <a:pt x="380999" y="954156"/>
+                  <a:pt x="403621" y="965548"/>
+                  <a:pt x="427382" y="974034"/>
+                </a:cubicBezTo>
+                <a:cubicBezTo>
+                  <a:pt x="450096" y="982146"/>
+                  <a:pt x="473651" y="987698"/>
+                  <a:pt x="496956" y="993913"/>
+                </a:cubicBezTo>
+                <a:cubicBezTo>
+                  <a:pt x="581166" y="1016369"/>
+                  <a:pt x="584407" y="1015379"/>
+                  <a:pt x="675860" y="1033669"/>
+                </a:cubicBezTo>
+                <a:cubicBezTo>
+                  <a:pt x="696607" y="1047500"/>
+                  <a:pt x="727815" y="1067508"/>
+                  <a:pt x="745434" y="1083365"/>
+                </a:cubicBezTo>
+                <a:cubicBezTo>
+                  <a:pt x="766330" y="1102171"/>
+                  <a:pt x="789475" y="1119609"/>
+                  <a:pt x="805069" y="1143000"/>
+                </a:cubicBezTo>
+                <a:cubicBezTo>
+                  <a:pt x="830145" y="1180614"/>
+                  <a:pt x="816500" y="1164371"/>
+                  <a:pt x="844826" y="1192695"/>
+                </a:cubicBezTo>
+                <a:cubicBezTo>
+                  <a:pt x="862496" y="1228036"/>
+                  <a:pt x="882269" y="1278061"/>
+                  <a:pt x="924339" y="1292086"/>
+                </a:cubicBezTo>
+                <a:lnTo>
+                  <a:pt x="954156" y="1302026"/>
+                </a:lnTo>
+                <a:cubicBezTo>
+                  <a:pt x="1009359" y="1357227"/>
+                  <a:pt x="965627" y="1326084"/>
+                  <a:pt x="1083365" y="1341782"/>
+                </a:cubicBezTo>
+                <a:cubicBezTo>
+                  <a:pt x="1100110" y="1344015"/>
+                  <a:pt x="1116671" y="1347624"/>
+                  <a:pt x="1133060" y="1351721"/>
+                </a:cubicBezTo>
+                <a:cubicBezTo>
+                  <a:pt x="1143224" y="1354262"/>
+                  <a:pt x="1152493" y="1360275"/>
+                  <a:pt x="1162878" y="1361660"/>
+                </a:cubicBezTo>
+                <a:cubicBezTo>
+                  <a:pt x="1202422" y="1366933"/>
+                  <a:pt x="1242391" y="1368287"/>
+                  <a:pt x="1282147" y="1371600"/>
+                </a:cubicBezTo>
+                <a:cubicBezTo>
+                  <a:pt x="1302025" y="1378226"/>
+                  <a:pt x="1321147" y="1387837"/>
+                  <a:pt x="1341782" y="1391478"/>
+                </a:cubicBezTo>
+                <a:cubicBezTo>
+                  <a:pt x="1377819" y="1397837"/>
+                  <a:pt x="1414840" y="1396581"/>
+                  <a:pt x="1451113" y="1401417"/>
+                </a:cubicBezTo>
+                <a:cubicBezTo>
+                  <a:pt x="1464653" y="1403222"/>
+                  <a:pt x="1477617" y="1408043"/>
+                  <a:pt x="1490869" y="1411356"/>
+                </a:cubicBezTo>
+                <a:cubicBezTo>
+                  <a:pt x="1646582" y="1408043"/>
+                  <a:pt x="1802509" y="1410219"/>
+                  <a:pt x="1958008" y="1401417"/>
+                </a:cubicBezTo>
+                <a:cubicBezTo>
+                  <a:pt x="1978928" y="1400233"/>
+                  <a:pt x="1997573" y="1387560"/>
+                  <a:pt x="2017643" y="1381539"/>
+                </a:cubicBezTo>
+                <a:cubicBezTo>
+                  <a:pt x="2030727" y="1377614"/>
+                  <a:pt x="2044148" y="1374913"/>
+                  <a:pt x="2057400" y="1371600"/>
+                </a:cubicBezTo>
+                <a:cubicBezTo>
+                  <a:pt x="2077297" y="1351702"/>
+                  <a:pt x="2090452" y="1336671"/>
+                  <a:pt x="2117034" y="1321904"/>
+                </a:cubicBezTo>
+                <a:cubicBezTo>
+                  <a:pt x="2132630" y="1313240"/>
+                  <a:pt x="2150772" y="1310005"/>
+                  <a:pt x="2166730" y="1302026"/>
+                </a:cubicBezTo>
+                <a:cubicBezTo>
+                  <a:pt x="2177414" y="1296684"/>
+                  <a:pt x="2186060" y="1287867"/>
+                  <a:pt x="2196547" y="1282147"/>
+                </a:cubicBezTo>
+                <a:cubicBezTo>
+                  <a:pt x="2222561" y="1267957"/>
+                  <a:pt x="2252354" y="1260171"/>
+                  <a:pt x="2276060" y="1242391"/>
+                </a:cubicBezTo>
+                <a:cubicBezTo>
+                  <a:pt x="2289312" y="1232452"/>
+                  <a:pt x="2300679" y="1219301"/>
+                  <a:pt x="2315817" y="1212573"/>
+                </a:cubicBezTo>
+                <a:cubicBezTo>
+                  <a:pt x="2331254" y="1205712"/>
+                  <a:pt x="2348948" y="1205947"/>
+                  <a:pt x="2365513" y="1202634"/>
+                </a:cubicBezTo>
+                <a:cubicBezTo>
+                  <a:pt x="2375452" y="1196008"/>
+                  <a:pt x="2384646" y="1188098"/>
+                  <a:pt x="2395330" y="1182756"/>
+                </a:cubicBezTo>
+                <a:cubicBezTo>
+                  <a:pt x="2422988" y="1168927"/>
+                  <a:pt x="2476830" y="1152277"/>
+                  <a:pt x="2504660" y="1143000"/>
+                </a:cubicBezTo>
+                <a:cubicBezTo>
+                  <a:pt x="2528419" y="1125180"/>
+                  <a:pt x="2581832" y="1088049"/>
+                  <a:pt x="2594113" y="1063486"/>
+                </a:cubicBezTo>
+                <a:lnTo>
+                  <a:pt x="2633869" y="983973"/>
+                </a:lnTo>
+                <a:cubicBezTo>
+                  <a:pt x="2640495" y="970721"/>
+                  <a:pt x="2650153" y="958591"/>
+                  <a:pt x="2653747" y="944217"/>
+                </a:cubicBezTo>
+                <a:cubicBezTo>
+                  <a:pt x="2657060" y="930965"/>
+                  <a:pt x="2658890" y="917250"/>
+                  <a:pt x="2663687" y="904460"/>
+                </a:cubicBezTo>
+                <a:cubicBezTo>
+                  <a:pt x="2668889" y="890587"/>
+                  <a:pt x="2677867" y="878380"/>
+                  <a:pt x="2683565" y="864704"/>
+                </a:cubicBezTo>
+                <a:cubicBezTo>
+                  <a:pt x="2694452" y="838575"/>
+                  <a:pt x="2703862" y="811849"/>
+                  <a:pt x="2713382" y="785191"/>
+                </a:cubicBezTo>
+                <a:cubicBezTo>
+                  <a:pt x="2720429" y="765458"/>
+                  <a:pt x="2729150" y="746103"/>
+                  <a:pt x="2733260" y="725556"/>
+                </a:cubicBezTo>
+                <a:cubicBezTo>
+                  <a:pt x="2745255" y="665587"/>
+                  <a:pt x="2737858" y="691887"/>
+                  <a:pt x="2753139" y="646043"/>
+                </a:cubicBezTo>
+                <a:cubicBezTo>
+                  <a:pt x="2746513" y="566530"/>
+                  <a:pt x="2744162" y="486544"/>
+                  <a:pt x="2733260" y="407504"/>
+                </a:cubicBezTo>
+                <a:cubicBezTo>
+                  <a:pt x="2730822" y="389830"/>
+                  <a:pt x="2724804" y="371514"/>
+                  <a:pt x="2713382" y="357808"/>
+                </a:cubicBezTo>
+                <a:cubicBezTo>
+                  <a:pt x="2706675" y="349760"/>
+                  <a:pt x="2693961" y="349168"/>
+                  <a:pt x="2683565" y="347869"/>
+                </a:cubicBezTo>
+                <a:cubicBezTo>
+                  <a:pt x="2614216" y="339200"/>
+                  <a:pt x="2544417" y="334617"/>
+                  <a:pt x="2474843" y="327991"/>
+                </a:cubicBezTo>
+                <a:cubicBezTo>
+                  <a:pt x="2408508" y="271133"/>
+                  <a:pt x="2405436" y="275204"/>
+                  <a:pt x="2355574" y="208721"/>
+                </a:cubicBezTo>
+                <a:cubicBezTo>
+                  <a:pt x="2321374" y="163121"/>
+                  <a:pt x="2281673" y="120555"/>
+                  <a:pt x="2256182" y="69573"/>
+                </a:cubicBezTo>
+                <a:cubicBezTo>
+                  <a:pt x="2249556" y="56321"/>
+                  <a:pt x="2245789" y="41199"/>
+                  <a:pt x="2236304" y="29817"/>
+                </a:cubicBezTo>
+                <a:cubicBezTo>
+                  <a:pt x="2218241" y="8142"/>
+                  <a:pt x="2191636" y="6226"/>
+                  <a:pt x="2166730" y="0"/>
+                </a:cubicBezTo>
+                <a:lnTo>
+                  <a:pt x="1699591" y="9939"/>
+                </a:lnTo>
+                <a:cubicBezTo>
+                  <a:pt x="1663019" y="11200"/>
+                  <a:pt x="1626297" y="13519"/>
+                  <a:pt x="1590260" y="19878"/>
+                </a:cubicBezTo>
+                <a:cubicBezTo>
+                  <a:pt x="1563497" y="24601"/>
+                  <a:pt x="1481479" y="59360"/>
+                  <a:pt x="1461052" y="69573"/>
+                </a:cubicBezTo>
+                <a:cubicBezTo>
+                  <a:pt x="1443773" y="78212"/>
+                  <a:pt x="1429009" y="91545"/>
+                  <a:pt x="1411356" y="99391"/>
+                </a:cubicBezTo>
+                <a:cubicBezTo>
+                  <a:pt x="1398874" y="104939"/>
+                  <a:pt x="1384852" y="106017"/>
+                  <a:pt x="1371600" y="109330"/>
+                </a:cubicBezTo>
+                <a:cubicBezTo>
+                  <a:pt x="1311965" y="102704"/>
+                  <a:pt x="1252094" y="97938"/>
+                  <a:pt x="1192695" y="89452"/>
+                </a:cubicBezTo>
+                <a:cubicBezTo>
+                  <a:pt x="1136078" y="81364"/>
+                  <a:pt x="1079214" y="73505"/>
+                  <a:pt x="1023730" y="59634"/>
+                </a:cubicBezTo>
+                <a:cubicBezTo>
+                  <a:pt x="921490" y="34074"/>
+                  <a:pt x="971262" y="43620"/>
+                  <a:pt x="874643" y="29817"/>
+                </a:cubicBezTo>
+                <a:cubicBezTo>
+                  <a:pt x="810563" y="8457"/>
+                  <a:pt x="829824" y="24755"/>
+                  <a:pt x="785191" y="0"/>
+                </a:cubicBezTo>
+                <a:close/>
+              </a:path>
+            </a:pathLst>
+          </a:custGeom>
+          <a:solidFill>
+            <a:srgbClr val="E0E9C4"/>
+          </a:solidFill>
+          <a:ln w="25400">
+            <a:solidFill>
+              <a:schemeClr val="tx1"/>
+            </a:solidFill>
+          </a:ln>
+        </p:spPr>
+        <p:style>
+          <a:lnRef idx="2">
+            <a:schemeClr val="accent1">
+              <a:shade val="15000"/>
+            </a:schemeClr>
+          </a:lnRef>
+          <a:fillRef idx="1">
+            <a:schemeClr val="accent1"/>
+          </a:fillRef>
+          <a:effectRef idx="0">
+            <a:schemeClr val="accent1"/>
+          </a:effectRef>
+          <a:fontRef idx="minor">
+            <a:schemeClr val="lt1"/>
+          </a:fontRef>
+        </p:style>
+        <p:txBody>
+          <a:bodyPr rtlCol="0" anchor="ctr"/>
+          <a:lstStyle/>
+          <a:p>
+            <a:pPr algn="ctr"/>
+            <a:endParaRPr lang="hu-HU"/>
+          </a:p>
+        </p:txBody>
+      </p:sp>
+      <p:sp>
+        <p:nvSpPr>
+          <p:cNvPr id="2" name="Cím 1">
+            <a:extLst>
+              <a:ext uri="{FF2B5EF4-FFF2-40B4-BE49-F238E27FC236}">
+                <a16:creationId xmlns:a16="http://schemas.microsoft.com/office/drawing/2014/main" id="{96B81B95-538B-BACA-38E9-DE967D06602C}"/>
+              </a:ext>
+            </a:extLst>
+          </p:cNvPr>
+          <p:cNvSpPr>
+            <a:spLocks noGrp="1"/>
+          </p:cNvSpPr>
+          <p:nvPr>
+            <p:ph type="ctrTitle"/>
+          </p:nvPr>
+        </p:nvSpPr>
+        <p:spPr>
+          <a:xfrm>
+            <a:off x="449460" y="136765"/>
+            <a:ext cx="10904339" cy="1506978"/>
+          </a:xfrm>
+        </p:spPr>
+        <p:txBody>
+          <a:bodyPr anchor="ctr">
+            <a:normAutofit/>
+          </a:bodyPr>
+          <a:lstStyle/>
+          <a:p>
+            <a:pPr algn="l"/>
+            <a:r>
+              <a:rPr lang="hu-HU" sz="4300" dirty="0">
+                <a:latin typeface="Arial" panose="020B0604020202020204" pitchFamily="34" charset="0"/>
+                <a:cs typeface="Arial" panose="020B0604020202020204" pitchFamily="34" charset="0"/>
+              </a:rPr>
+              <a:t>Hengerszerű testek</a:t>
+            </a:r>
+          </a:p>
+        </p:txBody>
+      </p:sp>
+      <p:sp>
+        <p:nvSpPr>
+          <p:cNvPr id="4" name="Szövegdoboz 3">
+            <a:extLst>
+              <a:ext uri="{FF2B5EF4-FFF2-40B4-BE49-F238E27FC236}">
+                <a16:creationId xmlns:a16="http://schemas.microsoft.com/office/drawing/2014/main" id="{FC5B7C20-2013-4ABE-E801-73169E386D1B}"/>
+              </a:ext>
+            </a:extLst>
+          </p:cNvPr>
+          <p:cNvSpPr txBox="1"/>
+          <p:nvPr/>
+        </p:nvSpPr>
+        <p:spPr>
+          <a:xfrm>
+            <a:off x="449460" y="1363346"/>
+            <a:ext cx="6234369" cy="3724096"/>
+          </a:xfrm>
+          <a:prstGeom prst="rect">
+            <a:avLst/>
+          </a:prstGeom>
+          <a:noFill/>
+        </p:spPr>
+        <p:txBody>
+          <a:bodyPr wrap="square" rtlCol="0">
+            <a:spAutoFit/>
+          </a:bodyPr>
+          <a:lstStyle/>
+          <a:p>
+            <a:r>
+              <a:rPr lang="hu-HU" sz="2300" b="1" dirty="0">
+                <a:latin typeface="Arial" panose="020B0604020202020204" pitchFamily="34" charset="0"/>
+                <a:cs typeface="Arial" panose="020B0604020202020204" pitchFamily="34" charset="0"/>
+              </a:rPr>
+              <a:t>Hengerszerű test: </a:t>
+            </a:r>
+            <a:r>
+              <a:rPr lang="hu-HU" sz="2300" dirty="0">
+                <a:latin typeface="Arial" panose="020B0604020202020204" pitchFamily="34" charset="0"/>
+                <a:cs typeface="Arial" panose="020B0604020202020204" pitchFamily="34" charset="0"/>
+              </a:rPr>
+              <a:t>egy síkidomot a síkjával nem párhuzamos vektorral eltolunk </a:t>
+            </a:r>
+          </a:p>
+          <a:p>
+            <a:pPr marL="342900" indent="-342900">
+              <a:spcBef>
+                <a:spcPts val="1800"/>
+              </a:spcBef>
+              <a:spcAft>
+                <a:spcPts val="1800"/>
+              </a:spcAft>
+              <a:buClr>
+                <a:srgbClr val="819839"/>
+              </a:buClr>
+              <a:buFont typeface="Wingdings" panose="05000000000000000000" pitchFamily="2" charset="2"/>
+              <a:buChar char="§"/>
+            </a:pPr>
+            <a:r>
+              <a:rPr lang="hu-HU" sz="2300" i="1" dirty="0">
+                <a:latin typeface="Arial" panose="020B0604020202020204" pitchFamily="34" charset="0"/>
+                <a:cs typeface="Arial" panose="020B0604020202020204" pitchFamily="34" charset="0"/>
+              </a:rPr>
+              <a:t>alaplap és fedőlap: </a:t>
+            </a:r>
+            <a:r>
+              <a:rPr lang="hu-HU" sz="2300" dirty="0">
+                <a:latin typeface="Arial" panose="020B0604020202020204" pitchFamily="34" charset="0"/>
+                <a:cs typeface="Arial" panose="020B0604020202020204" pitchFamily="34" charset="0"/>
+              </a:rPr>
+              <a:t>két egybevágó, egymással párhuzamos síkidom</a:t>
+            </a:r>
+          </a:p>
+          <a:p>
+            <a:pPr marL="342900" indent="-342900">
+              <a:spcBef>
+                <a:spcPts val="1800"/>
+              </a:spcBef>
+              <a:spcAft>
+                <a:spcPts val="1800"/>
+              </a:spcAft>
+              <a:buClr>
+                <a:srgbClr val="819839"/>
+              </a:buClr>
+              <a:buFont typeface="Wingdings" panose="05000000000000000000" pitchFamily="2" charset="2"/>
+              <a:buChar char="§"/>
+            </a:pPr>
+            <a:r>
+              <a:rPr lang="hu-HU" sz="2300" i="1" dirty="0">
+                <a:latin typeface="Arial" panose="020B0604020202020204" pitchFamily="34" charset="0"/>
+                <a:cs typeface="Arial" panose="020B0604020202020204" pitchFamily="34" charset="0"/>
+              </a:rPr>
+              <a:t>alkotók:</a:t>
+            </a:r>
+            <a:r>
+              <a:rPr lang="hu-HU" sz="2300" dirty="0">
+                <a:latin typeface="Arial" panose="020B0604020202020204" pitchFamily="34" charset="0"/>
+                <a:cs typeface="Arial" panose="020B0604020202020204" pitchFamily="34" charset="0"/>
+              </a:rPr>
+              <a:t> az eltolásnál egymásnak megfelelő pontokat összekötő szakaszok</a:t>
+            </a:r>
+          </a:p>
+          <a:p>
+            <a:pPr marL="342900" indent="-342900">
+              <a:spcBef>
+                <a:spcPts val="1800"/>
+              </a:spcBef>
+              <a:spcAft>
+                <a:spcPts val="1800"/>
+              </a:spcAft>
+              <a:buClr>
+                <a:srgbClr val="819839"/>
+              </a:buClr>
+              <a:buFont typeface="Wingdings" panose="05000000000000000000" pitchFamily="2" charset="2"/>
+              <a:buChar char="§"/>
+            </a:pPr>
+            <a:r>
+              <a:rPr lang="hu-HU" sz="2300" i="1" dirty="0">
+                <a:latin typeface="Arial" panose="020B0604020202020204" pitchFamily="34" charset="0"/>
+                <a:cs typeface="Arial" panose="020B0604020202020204" pitchFamily="34" charset="0"/>
+              </a:rPr>
+              <a:t>hasáb:</a:t>
+            </a:r>
+            <a:r>
+              <a:rPr lang="hu-HU" sz="2300" dirty="0">
+                <a:latin typeface="Arial" panose="020B0604020202020204" pitchFamily="34" charset="0"/>
+                <a:cs typeface="Arial" panose="020B0604020202020204" pitchFamily="34" charset="0"/>
+              </a:rPr>
+              <a:t> a síkidom sokszög</a:t>
+            </a:r>
+          </a:p>
+        </p:txBody>
+      </p:sp>
+      <p:sp>
+        <p:nvSpPr>
+          <p:cNvPr id="6" name="Szabadkézi sokszög: alakzat 5">
+            <a:extLst>
+              <a:ext uri="{FF2B5EF4-FFF2-40B4-BE49-F238E27FC236}">
+                <a16:creationId xmlns:a16="http://schemas.microsoft.com/office/drawing/2014/main" id="{1ECDA8A0-9B19-4E81-5F2B-B46A7E00930D}"/>
+              </a:ext>
+            </a:extLst>
+          </p:cNvPr>
+          <p:cNvSpPr/>
+          <p:nvPr/>
+        </p:nvSpPr>
+        <p:spPr>
+          <a:xfrm>
+            <a:off x="6840000" y="4320000"/>
+            <a:ext cx="2880000" cy="1440000"/>
+          </a:xfrm>
+          <a:custGeom>
+            <a:avLst/>
+            <a:gdLst>
+              <a:gd name="connsiteX0" fmla="*/ 785191 w 2753139"/>
+              <a:gd name="connsiteY0" fmla="*/ 0 h 1411356"/>
+              <a:gd name="connsiteX1" fmla="*/ 785191 w 2753139"/>
+              <a:gd name="connsiteY1" fmla="*/ 0 h 1411356"/>
+              <a:gd name="connsiteX2" fmla="*/ 556591 w 2753139"/>
+              <a:gd name="connsiteY2" fmla="*/ 59634 h 1411356"/>
+              <a:gd name="connsiteX3" fmla="*/ 457200 w 2753139"/>
+              <a:gd name="connsiteY3" fmla="*/ 89452 h 1411356"/>
+              <a:gd name="connsiteX4" fmla="*/ 347869 w 2753139"/>
+              <a:gd name="connsiteY4" fmla="*/ 159026 h 1411356"/>
+              <a:gd name="connsiteX5" fmla="*/ 298174 w 2753139"/>
+              <a:gd name="connsiteY5" fmla="*/ 188843 h 1411356"/>
+              <a:gd name="connsiteX6" fmla="*/ 258417 w 2753139"/>
+              <a:gd name="connsiteY6" fmla="*/ 218660 h 1411356"/>
+              <a:gd name="connsiteX7" fmla="*/ 208721 w 2753139"/>
+              <a:gd name="connsiteY7" fmla="*/ 238539 h 1411356"/>
+              <a:gd name="connsiteX8" fmla="*/ 159026 w 2753139"/>
+              <a:gd name="connsiteY8" fmla="*/ 288234 h 1411356"/>
+              <a:gd name="connsiteX9" fmla="*/ 89452 w 2753139"/>
+              <a:gd name="connsiteY9" fmla="*/ 337930 h 1411356"/>
+              <a:gd name="connsiteX10" fmla="*/ 59634 w 2753139"/>
+              <a:gd name="connsiteY10" fmla="*/ 387626 h 1411356"/>
+              <a:gd name="connsiteX11" fmla="*/ 9939 w 2753139"/>
+              <a:gd name="connsiteY11" fmla="*/ 496956 h 1411356"/>
+              <a:gd name="connsiteX12" fmla="*/ 0 w 2753139"/>
+              <a:gd name="connsiteY12" fmla="*/ 536713 h 1411356"/>
+              <a:gd name="connsiteX13" fmla="*/ 19878 w 2753139"/>
+              <a:gd name="connsiteY13" fmla="*/ 695739 h 1411356"/>
+              <a:gd name="connsiteX14" fmla="*/ 39756 w 2753139"/>
+              <a:gd name="connsiteY14" fmla="*/ 725556 h 1411356"/>
+              <a:gd name="connsiteX15" fmla="*/ 49695 w 2753139"/>
+              <a:gd name="connsiteY15" fmla="*/ 765313 h 1411356"/>
+              <a:gd name="connsiteX16" fmla="*/ 69574 w 2753139"/>
+              <a:gd name="connsiteY16" fmla="*/ 795130 h 1411356"/>
+              <a:gd name="connsiteX17" fmla="*/ 129208 w 2753139"/>
+              <a:gd name="connsiteY17" fmla="*/ 864704 h 1411356"/>
+              <a:gd name="connsiteX18" fmla="*/ 159026 w 2753139"/>
+              <a:gd name="connsiteY18" fmla="*/ 884582 h 1411356"/>
+              <a:gd name="connsiteX19" fmla="*/ 248478 w 2753139"/>
+              <a:gd name="connsiteY19" fmla="*/ 914400 h 1411356"/>
+              <a:gd name="connsiteX20" fmla="*/ 357808 w 2753139"/>
+              <a:gd name="connsiteY20" fmla="*/ 944217 h 1411356"/>
+              <a:gd name="connsiteX21" fmla="*/ 427382 w 2753139"/>
+              <a:gd name="connsiteY21" fmla="*/ 974034 h 1411356"/>
+              <a:gd name="connsiteX22" fmla="*/ 496956 w 2753139"/>
+              <a:gd name="connsiteY22" fmla="*/ 993913 h 1411356"/>
+              <a:gd name="connsiteX23" fmla="*/ 675860 w 2753139"/>
+              <a:gd name="connsiteY23" fmla="*/ 1033669 h 1411356"/>
+              <a:gd name="connsiteX24" fmla="*/ 745434 w 2753139"/>
+              <a:gd name="connsiteY24" fmla="*/ 1083365 h 1411356"/>
+              <a:gd name="connsiteX25" fmla="*/ 805069 w 2753139"/>
+              <a:gd name="connsiteY25" fmla="*/ 1143000 h 1411356"/>
+              <a:gd name="connsiteX26" fmla="*/ 844826 w 2753139"/>
+              <a:gd name="connsiteY26" fmla="*/ 1192695 h 1411356"/>
+              <a:gd name="connsiteX27" fmla="*/ 924339 w 2753139"/>
+              <a:gd name="connsiteY27" fmla="*/ 1292086 h 1411356"/>
+              <a:gd name="connsiteX28" fmla="*/ 954156 w 2753139"/>
+              <a:gd name="connsiteY28" fmla="*/ 1302026 h 1411356"/>
+              <a:gd name="connsiteX29" fmla="*/ 1083365 w 2753139"/>
+              <a:gd name="connsiteY29" fmla="*/ 1341782 h 1411356"/>
+              <a:gd name="connsiteX30" fmla="*/ 1133060 w 2753139"/>
+              <a:gd name="connsiteY30" fmla="*/ 1351721 h 1411356"/>
+              <a:gd name="connsiteX31" fmla="*/ 1162878 w 2753139"/>
+              <a:gd name="connsiteY31" fmla="*/ 1361660 h 1411356"/>
+              <a:gd name="connsiteX32" fmla="*/ 1282147 w 2753139"/>
+              <a:gd name="connsiteY32" fmla="*/ 1371600 h 1411356"/>
+              <a:gd name="connsiteX33" fmla="*/ 1341782 w 2753139"/>
+              <a:gd name="connsiteY33" fmla="*/ 1391478 h 1411356"/>
+              <a:gd name="connsiteX34" fmla="*/ 1451113 w 2753139"/>
+              <a:gd name="connsiteY34" fmla="*/ 1401417 h 1411356"/>
+              <a:gd name="connsiteX35" fmla="*/ 1490869 w 2753139"/>
+              <a:gd name="connsiteY35" fmla="*/ 1411356 h 1411356"/>
+              <a:gd name="connsiteX36" fmla="*/ 1958008 w 2753139"/>
+              <a:gd name="connsiteY36" fmla="*/ 1401417 h 1411356"/>
+              <a:gd name="connsiteX37" fmla="*/ 2017643 w 2753139"/>
+              <a:gd name="connsiteY37" fmla="*/ 1381539 h 1411356"/>
+              <a:gd name="connsiteX38" fmla="*/ 2057400 w 2753139"/>
+              <a:gd name="connsiteY38" fmla="*/ 1371600 h 1411356"/>
+              <a:gd name="connsiteX39" fmla="*/ 2117034 w 2753139"/>
+              <a:gd name="connsiteY39" fmla="*/ 1321904 h 1411356"/>
+              <a:gd name="connsiteX40" fmla="*/ 2166730 w 2753139"/>
+              <a:gd name="connsiteY40" fmla="*/ 1302026 h 1411356"/>
+              <a:gd name="connsiteX41" fmla="*/ 2196547 w 2753139"/>
+              <a:gd name="connsiteY41" fmla="*/ 1282147 h 1411356"/>
+              <a:gd name="connsiteX42" fmla="*/ 2276060 w 2753139"/>
+              <a:gd name="connsiteY42" fmla="*/ 1242391 h 1411356"/>
+              <a:gd name="connsiteX43" fmla="*/ 2315817 w 2753139"/>
+              <a:gd name="connsiteY43" fmla="*/ 1212573 h 1411356"/>
+              <a:gd name="connsiteX44" fmla="*/ 2365513 w 2753139"/>
+              <a:gd name="connsiteY44" fmla="*/ 1202634 h 1411356"/>
+              <a:gd name="connsiteX45" fmla="*/ 2395330 w 2753139"/>
+              <a:gd name="connsiteY45" fmla="*/ 1182756 h 1411356"/>
+              <a:gd name="connsiteX46" fmla="*/ 2504660 w 2753139"/>
+              <a:gd name="connsiteY46" fmla="*/ 1143000 h 1411356"/>
+              <a:gd name="connsiteX47" fmla="*/ 2594113 w 2753139"/>
+              <a:gd name="connsiteY47" fmla="*/ 1063486 h 1411356"/>
+              <a:gd name="connsiteX48" fmla="*/ 2633869 w 2753139"/>
+              <a:gd name="connsiteY48" fmla="*/ 983973 h 1411356"/>
+              <a:gd name="connsiteX49" fmla="*/ 2653747 w 2753139"/>
+              <a:gd name="connsiteY49" fmla="*/ 944217 h 1411356"/>
+              <a:gd name="connsiteX50" fmla="*/ 2663687 w 2753139"/>
+              <a:gd name="connsiteY50" fmla="*/ 904460 h 1411356"/>
+              <a:gd name="connsiteX51" fmla="*/ 2683565 w 2753139"/>
+              <a:gd name="connsiteY51" fmla="*/ 864704 h 1411356"/>
+              <a:gd name="connsiteX52" fmla="*/ 2713382 w 2753139"/>
+              <a:gd name="connsiteY52" fmla="*/ 785191 h 1411356"/>
+              <a:gd name="connsiteX53" fmla="*/ 2733260 w 2753139"/>
+              <a:gd name="connsiteY53" fmla="*/ 725556 h 1411356"/>
+              <a:gd name="connsiteX54" fmla="*/ 2753139 w 2753139"/>
+              <a:gd name="connsiteY54" fmla="*/ 646043 h 1411356"/>
+              <a:gd name="connsiteX55" fmla="*/ 2733260 w 2753139"/>
+              <a:gd name="connsiteY55" fmla="*/ 407504 h 1411356"/>
+              <a:gd name="connsiteX56" fmla="*/ 2713382 w 2753139"/>
+              <a:gd name="connsiteY56" fmla="*/ 357808 h 1411356"/>
+              <a:gd name="connsiteX57" fmla="*/ 2683565 w 2753139"/>
+              <a:gd name="connsiteY57" fmla="*/ 347869 h 1411356"/>
+              <a:gd name="connsiteX58" fmla="*/ 2474843 w 2753139"/>
+              <a:gd name="connsiteY58" fmla="*/ 327991 h 1411356"/>
+              <a:gd name="connsiteX59" fmla="*/ 2355574 w 2753139"/>
+              <a:gd name="connsiteY59" fmla="*/ 208721 h 1411356"/>
+              <a:gd name="connsiteX60" fmla="*/ 2256182 w 2753139"/>
+              <a:gd name="connsiteY60" fmla="*/ 69573 h 1411356"/>
+              <a:gd name="connsiteX61" fmla="*/ 2236304 w 2753139"/>
+              <a:gd name="connsiteY61" fmla="*/ 29817 h 1411356"/>
+              <a:gd name="connsiteX62" fmla="*/ 2166730 w 2753139"/>
+              <a:gd name="connsiteY62" fmla="*/ 0 h 1411356"/>
+              <a:gd name="connsiteX63" fmla="*/ 1699591 w 2753139"/>
+              <a:gd name="connsiteY63" fmla="*/ 9939 h 1411356"/>
+              <a:gd name="connsiteX64" fmla="*/ 1590260 w 2753139"/>
+              <a:gd name="connsiteY64" fmla="*/ 19878 h 1411356"/>
+              <a:gd name="connsiteX65" fmla="*/ 1461052 w 2753139"/>
+              <a:gd name="connsiteY65" fmla="*/ 69573 h 1411356"/>
+              <a:gd name="connsiteX66" fmla="*/ 1411356 w 2753139"/>
+              <a:gd name="connsiteY66" fmla="*/ 99391 h 1411356"/>
+              <a:gd name="connsiteX67" fmla="*/ 1371600 w 2753139"/>
+              <a:gd name="connsiteY67" fmla="*/ 109330 h 1411356"/>
+              <a:gd name="connsiteX68" fmla="*/ 1192695 w 2753139"/>
+              <a:gd name="connsiteY68" fmla="*/ 89452 h 1411356"/>
+              <a:gd name="connsiteX69" fmla="*/ 1023730 w 2753139"/>
+              <a:gd name="connsiteY69" fmla="*/ 59634 h 1411356"/>
+              <a:gd name="connsiteX70" fmla="*/ 874643 w 2753139"/>
+              <a:gd name="connsiteY70" fmla="*/ 29817 h 1411356"/>
+              <a:gd name="connsiteX71" fmla="*/ 785191 w 2753139"/>
+              <a:gd name="connsiteY71" fmla="*/ 0 h 1411356"/>
+            </a:gdLst>
+            <a:ahLst/>
+            <a:cxnLst>
+              <a:cxn ang="0">
+                <a:pos x="connsiteX0" y="connsiteY0"/>
+              </a:cxn>
+              <a:cxn ang="0">
+                <a:pos x="connsiteX1" y="connsiteY1"/>
+              </a:cxn>
+              <a:cxn ang="0">
+                <a:pos x="connsiteX2" y="connsiteY2"/>
+              </a:cxn>
+              <a:cxn ang="0">
+                <a:pos x="connsiteX3" y="connsiteY3"/>
+              </a:cxn>
+              <a:cxn ang="0">
+                <a:pos x="connsiteX4" y="connsiteY4"/>
+              </a:cxn>
+              <a:cxn ang="0">
+                <a:pos x="connsiteX5" y="connsiteY5"/>
+              </a:cxn>
+              <a:cxn ang="0">
+                <a:pos x="connsiteX6" y="connsiteY6"/>
+              </a:cxn>
+              <a:cxn ang="0">
+                <a:pos x="connsiteX7" y="connsiteY7"/>
+              </a:cxn>
+              <a:cxn ang="0">
+                <a:pos x="connsiteX8" y="connsiteY8"/>
+              </a:cxn>
+              <a:cxn ang="0">
+                <a:pos x="connsiteX9" y="connsiteY9"/>
+              </a:cxn>
+              <a:cxn ang="0">
+                <a:pos x="connsiteX10" y="connsiteY10"/>
+              </a:cxn>
+              <a:cxn ang="0">
+                <a:pos x="connsiteX11" y="connsiteY11"/>
+              </a:cxn>
+              <a:cxn ang="0">
+                <a:pos x="connsiteX12" y="connsiteY12"/>
+              </a:cxn>
+              <a:cxn ang="0">
+                <a:pos x="connsiteX13" y="connsiteY13"/>
+              </a:cxn>
+              <a:cxn ang="0">
+                <a:pos x="connsiteX14" y="connsiteY14"/>
+              </a:cxn>
+              <a:cxn ang="0">
+                <a:pos x="connsiteX15" y="connsiteY15"/>
+              </a:cxn>
+              <a:cxn ang="0">
+                <a:pos x="connsiteX16" y="connsiteY16"/>
+              </a:cxn>
+              <a:cxn ang="0">
+                <a:pos x="connsiteX17" y="connsiteY17"/>
+              </a:cxn>
+              <a:cxn ang="0">
+                <a:pos x="connsiteX18" y="connsiteY18"/>
+              </a:cxn>
+              <a:cxn ang="0">
+                <a:pos x="connsiteX19" y="connsiteY19"/>
+              </a:cxn>
+              <a:cxn ang="0">
+                <a:pos x="connsiteX20" y="connsiteY20"/>
+              </a:cxn>
+              <a:cxn ang="0">
+                <a:pos x="connsiteX21" y="connsiteY21"/>
+              </a:cxn>
+              <a:cxn ang="0">
+                <a:pos x="connsiteX22" y="connsiteY22"/>
+              </a:cxn>
+              <a:cxn ang="0">
+                <a:pos x="connsiteX23" y="connsiteY23"/>
+              </a:cxn>
+              <a:cxn ang="0">
+                <a:pos x="connsiteX24" y="connsiteY24"/>
+              </a:cxn>
+              <a:cxn ang="0">
+                <a:pos x="connsiteX25" y="connsiteY25"/>
+              </a:cxn>
+              <a:cxn ang="0">
+                <a:pos x="connsiteX26" y="connsiteY26"/>
+              </a:cxn>
+              <a:cxn ang="0">
+                <a:pos x="connsiteX27" y="connsiteY27"/>
+              </a:cxn>
+              <a:cxn ang="0">
+                <a:pos x="connsiteX28" y="connsiteY28"/>
+              </a:cxn>
+              <a:cxn ang="0">
+                <a:pos x="connsiteX29" y="connsiteY29"/>
+              </a:cxn>
+              <a:cxn ang="0">
+                <a:pos x="connsiteX30" y="connsiteY30"/>
+              </a:cxn>
+              <a:cxn ang="0">
+                <a:pos x="connsiteX31" y="connsiteY31"/>
+              </a:cxn>
+              <a:cxn ang="0">
+                <a:pos x="connsiteX32" y="connsiteY32"/>
+              </a:cxn>
+              <a:cxn ang="0">
+                <a:pos x="connsiteX33" y="connsiteY33"/>
+              </a:cxn>
+              <a:cxn ang="0">
+                <a:pos x="connsiteX34" y="connsiteY34"/>
+              </a:cxn>
+              <a:cxn ang="0">
+                <a:pos x="connsiteX35" y="connsiteY35"/>
+              </a:cxn>
+              <a:cxn ang="0">
+                <a:pos x="connsiteX36" y="connsiteY36"/>
+              </a:cxn>
+              <a:cxn ang="0">
+                <a:pos x="connsiteX37" y="connsiteY37"/>
+              </a:cxn>
+              <a:cxn ang="0">
+                <a:pos x="connsiteX38" y="connsiteY38"/>
+              </a:cxn>
+              <a:cxn ang="0">
+                <a:pos x="connsiteX39" y="connsiteY39"/>
+              </a:cxn>
+              <a:cxn ang="0">
+                <a:pos x="connsiteX40" y="connsiteY40"/>
+              </a:cxn>
+              <a:cxn ang="0">
+                <a:pos x="connsiteX41" y="connsiteY41"/>
+              </a:cxn>
+              <a:cxn ang="0">
+                <a:pos x="connsiteX42" y="connsiteY42"/>
+              </a:cxn>
+              <a:cxn ang="0">
+                <a:pos x="connsiteX43" y="connsiteY43"/>
+              </a:cxn>
+              <a:cxn ang="0">
+                <a:pos x="connsiteX44" y="connsiteY44"/>
+              </a:cxn>
+              <a:cxn ang="0">
+                <a:pos x="connsiteX45" y="connsiteY45"/>
+              </a:cxn>
+              <a:cxn ang="0">
+                <a:pos x="connsiteX46" y="connsiteY46"/>
+              </a:cxn>
+              <a:cxn ang="0">
+                <a:pos x="connsiteX47" y="connsiteY47"/>
+              </a:cxn>
+              <a:cxn ang="0">
+                <a:pos x="connsiteX48" y="connsiteY48"/>
+              </a:cxn>
+              <a:cxn ang="0">
+                <a:pos x="connsiteX49" y="connsiteY49"/>
+              </a:cxn>
+              <a:cxn ang="0">
+                <a:pos x="connsiteX50" y="connsiteY50"/>
+              </a:cxn>
+              <a:cxn ang="0">
+                <a:pos x="connsiteX51" y="connsiteY51"/>
+              </a:cxn>
+              <a:cxn ang="0">
+                <a:pos x="connsiteX52" y="connsiteY52"/>
+              </a:cxn>
+              <a:cxn ang="0">
+                <a:pos x="connsiteX53" y="connsiteY53"/>
+              </a:cxn>
+              <a:cxn ang="0">
+                <a:pos x="connsiteX54" y="connsiteY54"/>
+              </a:cxn>
+              <a:cxn ang="0">
+                <a:pos x="connsiteX55" y="connsiteY55"/>
+              </a:cxn>
+              <a:cxn ang="0">
+                <a:pos x="connsiteX56" y="connsiteY56"/>
+              </a:cxn>
+              <a:cxn ang="0">
+                <a:pos x="connsiteX57" y="connsiteY57"/>
+              </a:cxn>
+              <a:cxn ang="0">
+                <a:pos x="connsiteX58" y="connsiteY58"/>
+              </a:cxn>
+              <a:cxn ang="0">
+                <a:pos x="connsiteX59" y="connsiteY59"/>
+              </a:cxn>
+              <a:cxn ang="0">
+                <a:pos x="connsiteX60" y="connsiteY60"/>
+              </a:cxn>
+              <a:cxn ang="0">
+                <a:pos x="connsiteX61" y="connsiteY61"/>
+              </a:cxn>
+              <a:cxn ang="0">
+                <a:pos x="connsiteX62" y="connsiteY62"/>
+              </a:cxn>
+              <a:cxn ang="0">
+                <a:pos x="connsiteX63" y="connsiteY63"/>
+              </a:cxn>
+              <a:cxn ang="0">
+                <a:pos x="connsiteX64" y="connsiteY64"/>
+              </a:cxn>
+              <a:cxn ang="0">
+                <a:pos x="connsiteX65" y="connsiteY65"/>
+              </a:cxn>
+              <a:cxn ang="0">
+                <a:pos x="connsiteX66" y="connsiteY66"/>
+              </a:cxn>
+              <a:cxn ang="0">
+                <a:pos x="connsiteX67" y="connsiteY67"/>
+              </a:cxn>
+              <a:cxn ang="0">
+                <a:pos x="connsiteX68" y="connsiteY68"/>
+              </a:cxn>
+              <a:cxn ang="0">
+                <a:pos x="connsiteX69" y="connsiteY69"/>
+              </a:cxn>
+              <a:cxn ang="0">
+                <a:pos x="connsiteX70" y="connsiteY70"/>
+              </a:cxn>
+              <a:cxn ang="0">
+                <a:pos x="connsiteX71" y="connsiteY71"/>
+              </a:cxn>
+            </a:cxnLst>
+            <a:rect l="l" t="t" r="r" b="b"/>
+            <a:pathLst>
+              <a:path w="2753139" h="1411356">
+                <a:moveTo>
+                  <a:pt x="785191" y="0"/>
+                </a:moveTo>
+                <a:lnTo>
+                  <a:pt x="785191" y="0"/>
+                </a:lnTo>
+                <a:lnTo>
+                  <a:pt x="556591" y="59634"/>
+                </a:lnTo>
+                <a:cubicBezTo>
+                  <a:pt x="523221" y="68735"/>
+                  <a:pt x="488429" y="74581"/>
+                  <a:pt x="457200" y="89452"/>
+                </a:cubicBezTo>
+                <a:cubicBezTo>
+                  <a:pt x="418199" y="108024"/>
+                  <a:pt x="384500" y="136132"/>
+                  <a:pt x="347869" y="159026"/>
+                </a:cubicBezTo>
+                <a:cubicBezTo>
+                  <a:pt x="331487" y="169264"/>
+                  <a:pt x="313628" y="177252"/>
+                  <a:pt x="298174" y="188843"/>
+                </a:cubicBezTo>
+                <a:cubicBezTo>
+                  <a:pt x="284922" y="198782"/>
+                  <a:pt x="272898" y="210615"/>
+                  <a:pt x="258417" y="218660"/>
+                </a:cubicBezTo>
+                <a:cubicBezTo>
+                  <a:pt x="242821" y="227325"/>
+                  <a:pt x="225286" y="231913"/>
+                  <a:pt x="208721" y="238539"/>
+                </a:cubicBezTo>
+                <a:cubicBezTo>
+                  <a:pt x="192156" y="255104"/>
+                  <a:pt x="177518" y="273852"/>
+                  <a:pt x="159026" y="288234"/>
+                </a:cubicBezTo>
+                <a:cubicBezTo>
+                  <a:pt x="106018" y="329463"/>
+                  <a:pt x="130390" y="283346"/>
+                  <a:pt x="89452" y="337930"/>
+                </a:cubicBezTo>
+                <a:cubicBezTo>
+                  <a:pt x="77861" y="353385"/>
+                  <a:pt x="68793" y="370617"/>
+                  <a:pt x="59634" y="387626"/>
+                </a:cubicBezTo>
+                <a:cubicBezTo>
+                  <a:pt x="35681" y="432110"/>
+                  <a:pt x="22005" y="454725"/>
+                  <a:pt x="9939" y="496956"/>
+                </a:cubicBezTo>
+                <a:cubicBezTo>
+                  <a:pt x="6186" y="510091"/>
+                  <a:pt x="3313" y="523461"/>
+                  <a:pt x="0" y="536713"/>
+                </a:cubicBezTo>
+                <a:cubicBezTo>
+                  <a:pt x="1197" y="551072"/>
+                  <a:pt x="3645" y="657862"/>
+                  <a:pt x="19878" y="695739"/>
+                </a:cubicBezTo>
+                <a:cubicBezTo>
+                  <a:pt x="24583" y="706718"/>
+                  <a:pt x="33130" y="715617"/>
+                  <a:pt x="39756" y="725556"/>
+                </a:cubicBezTo>
+                <a:cubicBezTo>
+                  <a:pt x="43069" y="738808"/>
+                  <a:pt x="44314" y="752757"/>
+                  <a:pt x="49695" y="765313"/>
+                </a:cubicBezTo>
+                <a:cubicBezTo>
+                  <a:pt x="54401" y="776293"/>
+                  <a:pt x="62631" y="785410"/>
+                  <a:pt x="69574" y="795130"/>
+                </a:cubicBezTo>
+                <a:cubicBezTo>
+                  <a:pt x="88928" y="822225"/>
+                  <a:pt x="103713" y="843458"/>
+                  <a:pt x="129208" y="864704"/>
+                </a:cubicBezTo>
+                <a:cubicBezTo>
+                  <a:pt x="138385" y="872351"/>
+                  <a:pt x="147999" y="879988"/>
+                  <a:pt x="159026" y="884582"/>
+                </a:cubicBezTo>
+                <a:cubicBezTo>
+                  <a:pt x="188039" y="896671"/>
+                  <a:pt x="222326" y="896966"/>
+                  <a:pt x="248478" y="914400"/>
+                </a:cubicBezTo>
+                <a:cubicBezTo>
+                  <a:pt x="300520" y="949094"/>
+                  <a:pt x="266442" y="932796"/>
+                  <a:pt x="357808" y="944217"/>
+                </a:cubicBezTo>
+                <a:cubicBezTo>
+                  <a:pt x="380999" y="954156"/>
+                  <a:pt x="403621" y="965548"/>
+                  <a:pt x="427382" y="974034"/>
+                </a:cubicBezTo>
+                <a:cubicBezTo>
+                  <a:pt x="450096" y="982146"/>
+                  <a:pt x="473651" y="987698"/>
+                  <a:pt x="496956" y="993913"/>
+                </a:cubicBezTo>
+                <a:cubicBezTo>
+                  <a:pt x="581166" y="1016369"/>
+                  <a:pt x="584407" y="1015379"/>
+                  <a:pt x="675860" y="1033669"/>
+                </a:cubicBezTo>
+                <a:cubicBezTo>
+                  <a:pt x="696607" y="1047500"/>
+                  <a:pt x="727815" y="1067508"/>
+                  <a:pt x="745434" y="1083365"/>
+                </a:cubicBezTo>
+                <a:cubicBezTo>
+                  <a:pt x="766330" y="1102171"/>
+                  <a:pt x="789475" y="1119609"/>
+                  <a:pt x="805069" y="1143000"/>
+                </a:cubicBezTo>
+                <a:cubicBezTo>
+                  <a:pt x="830145" y="1180614"/>
+                  <a:pt x="816500" y="1164371"/>
+                  <a:pt x="844826" y="1192695"/>
+                </a:cubicBezTo>
+                <a:cubicBezTo>
+                  <a:pt x="862496" y="1228036"/>
+                  <a:pt x="882269" y="1278061"/>
+                  <a:pt x="924339" y="1292086"/>
+                </a:cubicBezTo>
+                <a:lnTo>
+                  <a:pt x="954156" y="1302026"/>
+                </a:lnTo>
+                <a:cubicBezTo>
+                  <a:pt x="1009359" y="1357227"/>
+                  <a:pt x="965627" y="1326084"/>
+                  <a:pt x="1083365" y="1341782"/>
+                </a:cubicBezTo>
+                <a:cubicBezTo>
+                  <a:pt x="1100110" y="1344015"/>
+                  <a:pt x="1116671" y="1347624"/>
+                  <a:pt x="1133060" y="1351721"/>
+                </a:cubicBezTo>
+                <a:cubicBezTo>
+                  <a:pt x="1143224" y="1354262"/>
+                  <a:pt x="1152493" y="1360275"/>
+                  <a:pt x="1162878" y="1361660"/>
+                </a:cubicBezTo>
+                <a:cubicBezTo>
+                  <a:pt x="1202422" y="1366933"/>
+                  <a:pt x="1242391" y="1368287"/>
+                  <a:pt x="1282147" y="1371600"/>
+                </a:cubicBezTo>
+                <a:cubicBezTo>
+                  <a:pt x="1302025" y="1378226"/>
+                  <a:pt x="1321147" y="1387837"/>
+                  <a:pt x="1341782" y="1391478"/>
+                </a:cubicBezTo>
+                <a:cubicBezTo>
+                  <a:pt x="1377819" y="1397837"/>
+                  <a:pt x="1414840" y="1396581"/>
+                  <a:pt x="1451113" y="1401417"/>
+                </a:cubicBezTo>
+                <a:cubicBezTo>
+                  <a:pt x="1464653" y="1403222"/>
+                  <a:pt x="1477617" y="1408043"/>
+                  <a:pt x="1490869" y="1411356"/>
+                </a:cubicBezTo>
+                <a:cubicBezTo>
+                  <a:pt x="1646582" y="1408043"/>
+                  <a:pt x="1802509" y="1410219"/>
+                  <a:pt x="1958008" y="1401417"/>
+                </a:cubicBezTo>
+                <a:cubicBezTo>
+                  <a:pt x="1978928" y="1400233"/>
+                  <a:pt x="1997573" y="1387560"/>
+                  <a:pt x="2017643" y="1381539"/>
+                </a:cubicBezTo>
+                <a:cubicBezTo>
+                  <a:pt x="2030727" y="1377614"/>
+                  <a:pt x="2044148" y="1374913"/>
+                  <a:pt x="2057400" y="1371600"/>
+                </a:cubicBezTo>
+                <a:cubicBezTo>
+                  <a:pt x="2077297" y="1351702"/>
+                  <a:pt x="2090452" y="1336671"/>
+                  <a:pt x="2117034" y="1321904"/>
+                </a:cubicBezTo>
+                <a:cubicBezTo>
+                  <a:pt x="2132630" y="1313240"/>
+                  <a:pt x="2150772" y="1310005"/>
+                  <a:pt x="2166730" y="1302026"/>
+                </a:cubicBezTo>
+                <a:cubicBezTo>
+                  <a:pt x="2177414" y="1296684"/>
+                  <a:pt x="2186060" y="1287867"/>
+                  <a:pt x="2196547" y="1282147"/>
+                </a:cubicBezTo>
+                <a:cubicBezTo>
+                  <a:pt x="2222561" y="1267957"/>
+                  <a:pt x="2252354" y="1260171"/>
+                  <a:pt x="2276060" y="1242391"/>
+                </a:cubicBezTo>
+                <a:cubicBezTo>
+                  <a:pt x="2289312" y="1232452"/>
+                  <a:pt x="2300679" y="1219301"/>
+                  <a:pt x="2315817" y="1212573"/>
+                </a:cubicBezTo>
+                <a:cubicBezTo>
+                  <a:pt x="2331254" y="1205712"/>
+                  <a:pt x="2348948" y="1205947"/>
+                  <a:pt x="2365513" y="1202634"/>
+                </a:cubicBezTo>
+                <a:cubicBezTo>
+                  <a:pt x="2375452" y="1196008"/>
+                  <a:pt x="2384646" y="1188098"/>
+                  <a:pt x="2395330" y="1182756"/>
+                </a:cubicBezTo>
+                <a:cubicBezTo>
+                  <a:pt x="2422988" y="1168927"/>
+                  <a:pt x="2476830" y="1152277"/>
+                  <a:pt x="2504660" y="1143000"/>
+                </a:cubicBezTo>
+                <a:cubicBezTo>
+                  <a:pt x="2528419" y="1125180"/>
+                  <a:pt x="2581832" y="1088049"/>
+                  <a:pt x="2594113" y="1063486"/>
+                </a:cubicBezTo>
+                <a:lnTo>
+                  <a:pt x="2633869" y="983973"/>
+                </a:lnTo>
+                <a:cubicBezTo>
+                  <a:pt x="2640495" y="970721"/>
+                  <a:pt x="2650153" y="958591"/>
+                  <a:pt x="2653747" y="944217"/>
+                </a:cubicBezTo>
+                <a:cubicBezTo>
+                  <a:pt x="2657060" y="930965"/>
+                  <a:pt x="2658890" y="917250"/>
+                  <a:pt x="2663687" y="904460"/>
+                </a:cubicBezTo>
+                <a:cubicBezTo>
+                  <a:pt x="2668889" y="890587"/>
+                  <a:pt x="2677867" y="878380"/>
+                  <a:pt x="2683565" y="864704"/>
+                </a:cubicBezTo>
+                <a:cubicBezTo>
+                  <a:pt x="2694452" y="838575"/>
+                  <a:pt x="2703862" y="811849"/>
+                  <a:pt x="2713382" y="785191"/>
+                </a:cubicBezTo>
+                <a:cubicBezTo>
+                  <a:pt x="2720429" y="765458"/>
+                  <a:pt x="2729150" y="746103"/>
+                  <a:pt x="2733260" y="725556"/>
+                </a:cubicBezTo>
+                <a:cubicBezTo>
+                  <a:pt x="2745255" y="665587"/>
+                  <a:pt x="2737858" y="691887"/>
+                  <a:pt x="2753139" y="646043"/>
+                </a:cubicBezTo>
+                <a:cubicBezTo>
+                  <a:pt x="2746513" y="566530"/>
+                  <a:pt x="2744162" y="486544"/>
+                  <a:pt x="2733260" y="407504"/>
+                </a:cubicBezTo>
+                <a:cubicBezTo>
+                  <a:pt x="2730822" y="389830"/>
+                  <a:pt x="2724804" y="371514"/>
+                  <a:pt x="2713382" y="357808"/>
+                </a:cubicBezTo>
+                <a:cubicBezTo>
+                  <a:pt x="2706675" y="349760"/>
+                  <a:pt x="2693961" y="349168"/>
+                  <a:pt x="2683565" y="347869"/>
+                </a:cubicBezTo>
+                <a:cubicBezTo>
+                  <a:pt x="2614216" y="339200"/>
+                  <a:pt x="2544417" y="334617"/>
+                  <a:pt x="2474843" y="327991"/>
+                </a:cubicBezTo>
+                <a:cubicBezTo>
+                  <a:pt x="2408508" y="271133"/>
+                  <a:pt x="2405436" y="275204"/>
+                  <a:pt x="2355574" y="208721"/>
+                </a:cubicBezTo>
+                <a:cubicBezTo>
+                  <a:pt x="2321374" y="163121"/>
+                  <a:pt x="2281673" y="120555"/>
+                  <a:pt x="2256182" y="69573"/>
+                </a:cubicBezTo>
+                <a:cubicBezTo>
+                  <a:pt x="2249556" y="56321"/>
+                  <a:pt x="2245789" y="41199"/>
+                  <a:pt x="2236304" y="29817"/>
+                </a:cubicBezTo>
+                <a:cubicBezTo>
+                  <a:pt x="2218241" y="8142"/>
+                  <a:pt x="2191636" y="6226"/>
+                  <a:pt x="2166730" y="0"/>
+                </a:cubicBezTo>
+                <a:lnTo>
+                  <a:pt x="1699591" y="9939"/>
+                </a:lnTo>
+                <a:cubicBezTo>
+                  <a:pt x="1663019" y="11200"/>
+                  <a:pt x="1626297" y="13519"/>
+                  <a:pt x="1590260" y="19878"/>
+                </a:cubicBezTo>
+                <a:cubicBezTo>
+                  <a:pt x="1563497" y="24601"/>
+                  <a:pt x="1481479" y="59360"/>
+                  <a:pt x="1461052" y="69573"/>
+                </a:cubicBezTo>
+                <a:cubicBezTo>
+                  <a:pt x="1443773" y="78212"/>
+                  <a:pt x="1429009" y="91545"/>
+                  <a:pt x="1411356" y="99391"/>
+                </a:cubicBezTo>
+                <a:cubicBezTo>
+                  <a:pt x="1398874" y="104939"/>
+                  <a:pt x="1384852" y="106017"/>
+                  <a:pt x="1371600" y="109330"/>
+                </a:cubicBezTo>
+                <a:cubicBezTo>
+                  <a:pt x="1311965" y="102704"/>
+                  <a:pt x="1252094" y="97938"/>
+                  <a:pt x="1192695" y="89452"/>
+                </a:cubicBezTo>
+                <a:cubicBezTo>
+                  <a:pt x="1136078" y="81364"/>
+                  <a:pt x="1079214" y="73505"/>
+                  <a:pt x="1023730" y="59634"/>
+                </a:cubicBezTo>
+                <a:cubicBezTo>
+                  <a:pt x="921490" y="34074"/>
+                  <a:pt x="971262" y="43620"/>
+                  <a:pt x="874643" y="29817"/>
+                </a:cubicBezTo>
+                <a:cubicBezTo>
+                  <a:pt x="810563" y="8457"/>
+                  <a:pt x="829824" y="24755"/>
+                  <a:pt x="785191" y="0"/>
+                </a:cubicBezTo>
+                <a:close/>
+              </a:path>
+            </a:pathLst>
+          </a:custGeom>
+          <a:solidFill>
+            <a:srgbClr val="E0E9C4"/>
+          </a:solidFill>
+          <a:ln w="25400">
+            <a:solidFill>
+              <a:schemeClr val="tx1"/>
+            </a:solidFill>
+          </a:ln>
+        </p:spPr>
+        <p:style>
+          <a:lnRef idx="2">
+            <a:schemeClr val="accent1">
+              <a:shade val="15000"/>
+            </a:schemeClr>
+          </a:lnRef>
+          <a:fillRef idx="1">
+            <a:schemeClr val="accent1"/>
+          </a:fillRef>
+          <a:effectRef idx="0">
+            <a:schemeClr val="accent1"/>
+          </a:effectRef>
+          <a:fontRef idx="minor">
+            <a:schemeClr val="lt1"/>
+          </a:fontRef>
+        </p:style>
+        <p:txBody>
+          <a:bodyPr rtlCol="0" anchor="ctr"/>
+          <a:lstStyle/>
+          <a:p>
+            <a:pPr algn="ctr"/>
+            <a:endParaRPr lang="hu-HU"/>
+          </a:p>
+        </p:txBody>
+      </p:sp>
+      <p:sp>
+        <p:nvSpPr>
+          <p:cNvPr id="8" name="Szabadkézi sokszög: alakzat 7">
+            <a:extLst>
+              <a:ext uri="{FF2B5EF4-FFF2-40B4-BE49-F238E27FC236}">
+                <a16:creationId xmlns:a16="http://schemas.microsoft.com/office/drawing/2014/main" id="{F72DEBBF-4B9B-76E8-0D68-BDC8D00E96AE}"/>
+              </a:ext>
+            </a:extLst>
+          </p:cNvPr>
+          <p:cNvSpPr/>
+          <p:nvPr/>
+        </p:nvSpPr>
+        <p:spPr>
+          <a:xfrm>
+            <a:off x="7920000" y="1440174"/>
+            <a:ext cx="2880000" cy="1440000"/>
+          </a:xfrm>
+          <a:custGeom>
+            <a:avLst/>
+            <a:gdLst>
+              <a:gd name="connsiteX0" fmla="*/ 785191 w 2753139"/>
+              <a:gd name="connsiteY0" fmla="*/ 0 h 1411356"/>
+              <a:gd name="connsiteX1" fmla="*/ 785191 w 2753139"/>
+              <a:gd name="connsiteY1" fmla="*/ 0 h 1411356"/>
+              <a:gd name="connsiteX2" fmla="*/ 556591 w 2753139"/>
+              <a:gd name="connsiteY2" fmla="*/ 59634 h 1411356"/>
+              <a:gd name="connsiteX3" fmla="*/ 457200 w 2753139"/>
+              <a:gd name="connsiteY3" fmla="*/ 89452 h 1411356"/>
+              <a:gd name="connsiteX4" fmla="*/ 347869 w 2753139"/>
+              <a:gd name="connsiteY4" fmla="*/ 159026 h 1411356"/>
+              <a:gd name="connsiteX5" fmla="*/ 298174 w 2753139"/>
+              <a:gd name="connsiteY5" fmla="*/ 188843 h 1411356"/>
+              <a:gd name="connsiteX6" fmla="*/ 258417 w 2753139"/>
+              <a:gd name="connsiteY6" fmla="*/ 218660 h 1411356"/>
+              <a:gd name="connsiteX7" fmla="*/ 208721 w 2753139"/>
+              <a:gd name="connsiteY7" fmla="*/ 238539 h 1411356"/>
+              <a:gd name="connsiteX8" fmla="*/ 159026 w 2753139"/>
+              <a:gd name="connsiteY8" fmla="*/ 288234 h 1411356"/>
+              <a:gd name="connsiteX9" fmla="*/ 89452 w 2753139"/>
+              <a:gd name="connsiteY9" fmla="*/ 337930 h 1411356"/>
+              <a:gd name="connsiteX10" fmla="*/ 59634 w 2753139"/>
+              <a:gd name="connsiteY10" fmla="*/ 387626 h 1411356"/>
+              <a:gd name="connsiteX11" fmla="*/ 9939 w 2753139"/>
+              <a:gd name="connsiteY11" fmla="*/ 496956 h 1411356"/>
+              <a:gd name="connsiteX12" fmla="*/ 0 w 2753139"/>
+              <a:gd name="connsiteY12" fmla="*/ 536713 h 1411356"/>
+              <a:gd name="connsiteX13" fmla="*/ 19878 w 2753139"/>
+              <a:gd name="connsiteY13" fmla="*/ 695739 h 1411356"/>
+              <a:gd name="connsiteX14" fmla="*/ 39756 w 2753139"/>
+              <a:gd name="connsiteY14" fmla="*/ 725556 h 1411356"/>
+              <a:gd name="connsiteX15" fmla="*/ 49695 w 2753139"/>
+              <a:gd name="connsiteY15" fmla="*/ 765313 h 1411356"/>
+              <a:gd name="connsiteX16" fmla="*/ 69574 w 2753139"/>
+              <a:gd name="connsiteY16" fmla="*/ 795130 h 1411356"/>
+              <a:gd name="connsiteX17" fmla="*/ 129208 w 2753139"/>
+              <a:gd name="connsiteY17" fmla="*/ 864704 h 1411356"/>
+              <a:gd name="connsiteX18" fmla="*/ 159026 w 2753139"/>
+              <a:gd name="connsiteY18" fmla="*/ 884582 h 1411356"/>
+              <a:gd name="connsiteX19" fmla="*/ 248478 w 2753139"/>
+              <a:gd name="connsiteY19" fmla="*/ 914400 h 1411356"/>
+              <a:gd name="connsiteX20" fmla="*/ 357808 w 2753139"/>
+              <a:gd name="connsiteY20" fmla="*/ 944217 h 1411356"/>
+              <a:gd name="connsiteX21" fmla="*/ 427382 w 2753139"/>
+              <a:gd name="connsiteY21" fmla="*/ 974034 h 1411356"/>
+              <a:gd name="connsiteX22" fmla="*/ 496956 w 2753139"/>
+              <a:gd name="connsiteY22" fmla="*/ 993913 h 1411356"/>
+              <a:gd name="connsiteX23" fmla="*/ 675860 w 2753139"/>
+              <a:gd name="connsiteY23" fmla="*/ 1033669 h 1411356"/>
+              <a:gd name="connsiteX24" fmla="*/ 745434 w 2753139"/>
+              <a:gd name="connsiteY24" fmla="*/ 1083365 h 1411356"/>
+              <a:gd name="connsiteX25" fmla="*/ 805069 w 2753139"/>
+              <a:gd name="connsiteY25" fmla="*/ 1143000 h 1411356"/>
+              <a:gd name="connsiteX26" fmla="*/ 844826 w 2753139"/>
+              <a:gd name="connsiteY26" fmla="*/ 1192695 h 1411356"/>
+              <a:gd name="connsiteX27" fmla="*/ 924339 w 2753139"/>
+              <a:gd name="connsiteY27" fmla="*/ 1292086 h 1411356"/>
+              <a:gd name="connsiteX28" fmla="*/ 954156 w 2753139"/>
+              <a:gd name="connsiteY28" fmla="*/ 1302026 h 1411356"/>
+              <a:gd name="connsiteX29" fmla="*/ 1083365 w 2753139"/>
+              <a:gd name="connsiteY29" fmla="*/ 1341782 h 1411356"/>
+              <a:gd name="connsiteX30" fmla="*/ 1133060 w 2753139"/>
+              <a:gd name="connsiteY30" fmla="*/ 1351721 h 1411356"/>
+              <a:gd name="connsiteX31" fmla="*/ 1162878 w 2753139"/>
+              <a:gd name="connsiteY31" fmla="*/ 1361660 h 1411356"/>
+              <a:gd name="connsiteX32" fmla="*/ 1282147 w 2753139"/>
+              <a:gd name="connsiteY32" fmla="*/ 1371600 h 1411356"/>
+              <a:gd name="connsiteX33" fmla="*/ 1341782 w 2753139"/>
+              <a:gd name="connsiteY33" fmla="*/ 1391478 h 1411356"/>
+              <a:gd name="connsiteX34" fmla="*/ 1451113 w 2753139"/>
+              <a:gd name="connsiteY34" fmla="*/ 1401417 h 1411356"/>
+              <a:gd name="connsiteX35" fmla="*/ 1490869 w 2753139"/>
+              <a:gd name="connsiteY35" fmla="*/ 1411356 h 1411356"/>
+              <a:gd name="connsiteX36" fmla="*/ 1958008 w 2753139"/>
+              <a:gd name="connsiteY36" fmla="*/ 1401417 h 1411356"/>
+              <a:gd name="connsiteX37" fmla="*/ 2017643 w 2753139"/>
+              <a:gd name="connsiteY37" fmla="*/ 1381539 h 1411356"/>
+              <a:gd name="connsiteX38" fmla="*/ 2057400 w 2753139"/>
+              <a:gd name="connsiteY38" fmla="*/ 1371600 h 1411356"/>
+              <a:gd name="connsiteX39" fmla="*/ 2117034 w 2753139"/>
+              <a:gd name="connsiteY39" fmla="*/ 1321904 h 1411356"/>
+              <a:gd name="connsiteX40" fmla="*/ 2166730 w 2753139"/>
+              <a:gd name="connsiteY40" fmla="*/ 1302026 h 1411356"/>
+              <a:gd name="connsiteX41" fmla="*/ 2196547 w 2753139"/>
+              <a:gd name="connsiteY41" fmla="*/ 1282147 h 1411356"/>
+              <a:gd name="connsiteX42" fmla="*/ 2276060 w 2753139"/>
+              <a:gd name="connsiteY42" fmla="*/ 1242391 h 1411356"/>
+              <a:gd name="connsiteX43" fmla="*/ 2315817 w 2753139"/>
+              <a:gd name="connsiteY43" fmla="*/ 1212573 h 1411356"/>
+              <a:gd name="connsiteX44" fmla="*/ 2365513 w 2753139"/>
+              <a:gd name="connsiteY44" fmla="*/ 1202634 h 1411356"/>
+              <a:gd name="connsiteX45" fmla="*/ 2395330 w 2753139"/>
+              <a:gd name="connsiteY45" fmla="*/ 1182756 h 1411356"/>
+              <a:gd name="connsiteX46" fmla="*/ 2504660 w 2753139"/>
+              <a:gd name="connsiteY46" fmla="*/ 1143000 h 1411356"/>
+              <a:gd name="connsiteX47" fmla="*/ 2594113 w 2753139"/>
+              <a:gd name="connsiteY47" fmla="*/ 1063486 h 1411356"/>
+              <a:gd name="connsiteX48" fmla="*/ 2633869 w 2753139"/>
+              <a:gd name="connsiteY48" fmla="*/ 983973 h 1411356"/>
+              <a:gd name="connsiteX49" fmla="*/ 2653747 w 2753139"/>
+              <a:gd name="connsiteY49" fmla="*/ 944217 h 1411356"/>
+              <a:gd name="connsiteX50" fmla="*/ 2663687 w 2753139"/>
+              <a:gd name="connsiteY50" fmla="*/ 904460 h 1411356"/>
+              <a:gd name="connsiteX51" fmla="*/ 2683565 w 2753139"/>
+              <a:gd name="connsiteY51" fmla="*/ 864704 h 1411356"/>
+              <a:gd name="connsiteX52" fmla="*/ 2713382 w 2753139"/>
+              <a:gd name="connsiteY52" fmla="*/ 785191 h 1411356"/>
+              <a:gd name="connsiteX53" fmla="*/ 2733260 w 2753139"/>
+              <a:gd name="connsiteY53" fmla="*/ 725556 h 1411356"/>
+              <a:gd name="connsiteX54" fmla="*/ 2753139 w 2753139"/>
+              <a:gd name="connsiteY54" fmla="*/ 646043 h 1411356"/>
+              <a:gd name="connsiteX55" fmla="*/ 2733260 w 2753139"/>
+              <a:gd name="connsiteY55" fmla="*/ 407504 h 1411356"/>
+              <a:gd name="connsiteX56" fmla="*/ 2713382 w 2753139"/>
+              <a:gd name="connsiteY56" fmla="*/ 357808 h 1411356"/>
+              <a:gd name="connsiteX57" fmla="*/ 2683565 w 2753139"/>
+              <a:gd name="connsiteY57" fmla="*/ 347869 h 1411356"/>
+              <a:gd name="connsiteX58" fmla="*/ 2474843 w 2753139"/>
+              <a:gd name="connsiteY58" fmla="*/ 327991 h 1411356"/>
+              <a:gd name="connsiteX59" fmla="*/ 2355574 w 2753139"/>
+              <a:gd name="connsiteY59" fmla="*/ 208721 h 1411356"/>
+              <a:gd name="connsiteX60" fmla="*/ 2256182 w 2753139"/>
+              <a:gd name="connsiteY60" fmla="*/ 69573 h 1411356"/>
+              <a:gd name="connsiteX61" fmla="*/ 2236304 w 2753139"/>
+              <a:gd name="connsiteY61" fmla="*/ 29817 h 1411356"/>
+              <a:gd name="connsiteX62" fmla="*/ 2166730 w 2753139"/>
+              <a:gd name="connsiteY62" fmla="*/ 0 h 1411356"/>
+              <a:gd name="connsiteX63" fmla="*/ 1699591 w 2753139"/>
+              <a:gd name="connsiteY63" fmla="*/ 9939 h 1411356"/>
+              <a:gd name="connsiteX64" fmla="*/ 1590260 w 2753139"/>
+              <a:gd name="connsiteY64" fmla="*/ 19878 h 1411356"/>
+              <a:gd name="connsiteX65" fmla="*/ 1461052 w 2753139"/>
+              <a:gd name="connsiteY65" fmla="*/ 69573 h 1411356"/>
+              <a:gd name="connsiteX66" fmla="*/ 1411356 w 2753139"/>
+              <a:gd name="connsiteY66" fmla="*/ 99391 h 1411356"/>
+              <a:gd name="connsiteX67" fmla="*/ 1371600 w 2753139"/>
+              <a:gd name="connsiteY67" fmla="*/ 109330 h 1411356"/>
+              <a:gd name="connsiteX68" fmla="*/ 1192695 w 2753139"/>
+              <a:gd name="connsiteY68" fmla="*/ 89452 h 1411356"/>
+              <a:gd name="connsiteX69" fmla="*/ 1023730 w 2753139"/>
+              <a:gd name="connsiteY69" fmla="*/ 59634 h 1411356"/>
+              <a:gd name="connsiteX70" fmla="*/ 874643 w 2753139"/>
+              <a:gd name="connsiteY70" fmla="*/ 29817 h 1411356"/>
+              <a:gd name="connsiteX71" fmla="*/ 785191 w 2753139"/>
+              <a:gd name="connsiteY71" fmla="*/ 0 h 1411356"/>
+            </a:gdLst>
+            <a:ahLst/>
+            <a:cxnLst>
+              <a:cxn ang="0">
+                <a:pos x="connsiteX0" y="connsiteY0"/>
+              </a:cxn>
+              <a:cxn ang="0">
+                <a:pos x="connsiteX1" y="connsiteY1"/>
+              </a:cxn>
+              <a:cxn ang="0">
+                <a:pos x="connsiteX2" y="connsiteY2"/>
+              </a:cxn>
+              <a:cxn ang="0">
+                <a:pos x="connsiteX3" y="connsiteY3"/>
+              </a:cxn>
+              <a:cxn ang="0">
+                <a:pos x="connsiteX4" y="connsiteY4"/>
+              </a:cxn>
+              <a:cxn ang="0">
+                <a:pos x="connsiteX5" y="connsiteY5"/>
+              </a:cxn>
+              <a:cxn ang="0">
+                <a:pos x="connsiteX6" y="connsiteY6"/>
+              </a:cxn>
+              <a:cxn ang="0">
+                <a:pos x="connsiteX7" y="connsiteY7"/>
+              </a:cxn>
+              <a:cxn ang="0">
+                <a:pos x="connsiteX8" y="connsiteY8"/>
+              </a:cxn>
+              <a:cxn ang="0">
+                <a:pos x="connsiteX9" y="connsiteY9"/>
+              </a:cxn>
+              <a:cxn ang="0">
+                <a:pos x="connsiteX10" y="connsiteY10"/>
+              </a:cxn>
+              <a:cxn ang="0">
+                <a:pos x="connsiteX11" y="connsiteY11"/>
+              </a:cxn>
+              <a:cxn ang="0">
+                <a:pos x="connsiteX12" y="connsiteY12"/>
+              </a:cxn>
+              <a:cxn ang="0">
+                <a:pos x="connsiteX13" y="connsiteY13"/>
+              </a:cxn>
+              <a:cxn ang="0">
+                <a:pos x="connsiteX14" y="connsiteY14"/>
+              </a:cxn>
+              <a:cxn ang="0">
+                <a:pos x="connsiteX15" y="connsiteY15"/>
+              </a:cxn>
+              <a:cxn ang="0">
+                <a:pos x="connsiteX16" y="connsiteY16"/>
+              </a:cxn>
+              <a:cxn ang="0">
+                <a:pos x="connsiteX17" y="connsiteY17"/>
+              </a:cxn>
+              <a:cxn ang="0">
+                <a:pos x="connsiteX18" y="connsiteY18"/>
+              </a:cxn>
+              <a:cxn ang="0">
+                <a:pos x="connsiteX19" y="connsiteY19"/>
+              </a:cxn>
+              <a:cxn ang="0">
+                <a:pos x="connsiteX20" y="connsiteY20"/>
+              </a:cxn>
+              <a:cxn ang="0">
+                <a:pos x="connsiteX21" y="connsiteY21"/>
+              </a:cxn>
+              <a:cxn ang="0">
+                <a:pos x="connsiteX22" y="connsiteY22"/>
+              </a:cxn>
+              <a:cxn ang="0">
+                <a:pos x="connsiteX23" y="connsiteY23"/>
+              </a:cxn>
+              <a:cxn ang="0">
+                <a:pos x="connsiteX24" y="connsiteY24"/>
+              </a:cxn>
+              <a:cxn ang="0">
+                <a:pos x="connsiteX25" y="connsiteY25"/>
+              </a:cxn>
+              <a:cxn ang="0">
+                <a:pos x="connsiteX26" y="connsiteY26"/>
+              </a:cxn>
+              <a:cxn ang="0">
+                <a:pos x="connsiteX27" y="connsiteY27"/>
+              </a:cxn>
+              <a:cxn ang="0">
+                <a:pos x="connsiteX28" y="connsiteY28"/>
+              </a:cxn>
+              <a:cxn ang="0">
+                <a:pos x="connsiteX29" y="connsiteY29"/>
+              </a:cxn>
+              <a:cxn ang="0">
+                <a:pos x="connsiteX30" y="connsiteY30"/>
+              </a:cxn>
+              <a:cxn ang="0">
+                <a:pos x="connsiteX31" y="connsiteY31"/>
+              </a:cxn>
+              <a:cxn ang="0">
+                <a:pos x="connsiteX32" y="connsiteY32"/>
+              </a:cxn>
+              <a:cxn ang="0">
+                <a:pos x="connsiteX33" y="connsiteY33"/>
+              </a:cxn>
+              <a:cxn ang="0">
+                <a:pos x="connsiteX34" y="connsiteY34"/>
+              </a:cxn>
+              <a:cxn ang="0">
+                <a:pos x="connsiteX35" y="connsiteY35"/>
+              </a:cxn>
+              <a:cxn ang="0">
+                <a:pos x="connsiteX36" y="connsiteY36"/>
+              </a:cxn>
+              <a:cxn ang="0">
+                <a:pos x="connsiteX37" y="connsiteY37"/>
+              </a:cxn>
+              <a:cxn ang="0">
+                <a:pos x="connsiteX38" y="connsiteY38"/>
+              </a:cxn>
+              <a:cxn ang="0">
+                <a:pos x="connsiteX39" y="connsiteY39"/>
+              </a:cxn>
+              <a:cxn ang="0">
+                <a:pos x="connsiteX40" y="connsiteY40"/>
+              </a:cxn>
+              <a:cxn ang="0">
+                <a:pos x="connsiteX41" y="connsiteY41"/>
+              </a:cxn>
+              <a:cxn ang="0">
+                <a:pos x="connsiteX42" y="connsiteY42"/>
+              </a:cxn>
+              <a:cxn ang="0">
+                <a:pos x="connsiteX43" y="connsiteY43"/>
+              </a:cxn>
+              <a:cxn ang="0">
+                <a:pos x="connsiteX44" y="connsiteY44"/>
+              </a:cxn>
+              <a:cxn ang="0">
+                <a:pos x="connsiteX45" y="connsiteY45"/>
+              </a:cxn>
+              <a:cxn ang="0">
+                <a:pos x="connsiteX46" y="connsiteY46"/>
+              </a:cxn>
+              <a:cxn ang="0">
+                <a:pos x="connsiteX47" y="connsiteY47"/>
+              </a:cxn>
+              <a:cxn ang="0">
+                <a:pos x="connsiteX48" y="connsiteY48"/>
+              </a:cxn>
+              <a:cxn ang="0">
+                <a:pos x="connsiteX49" y="connsiteY49"/>
+              </a:cxn>
+              <a:cxn ang="0">
+                <a:pos x="connsiteX50" y="connsiteY50"/>
+              </a:cxn>
+              <a:cxn ang="0">
+                <a:pos x="connsiteX51" y="connsiteY51"/>
+              </a:cxn>
+              <a:cxn ang="0">
+                <a:pos x="connsiteX52" y="connsiteY52"/>
+              </a:cxn>
+              <a:cxn ang="0">
+                <a:pos x="connsiteX53" y="connsiteY53"/>
+              </a:cxn>
+              <a:cxn ang="0">
+                <a:pos x="connsiteX54" y="connsiteY54"/>
+              </a:cxn>
+              <a:cxn ang="0">
+                <a:pos x="connsiteX55" y="connsiteY55"/>
+              </a:cxn>
+              <a:cxn ang="0">
+                <a:pos x="connsiteX56" y="connsiteY56"/>
+              </a:cxn>
+              <a:cxn ang="0">
+                <a:pos x="connsiteX57" y="connsiteY57"/>
+              </a:cxn>
+              <a:cxn ang="0">
+                <a:pos x="connsiteX58" y="connsiteY58"/>
+              </a:cxn>
+              <a:cxn ang="0">
+                <a:pos x="connsiteX59" y="connsiteY59"/>
+              </a:cxn>
+              <a:cxn ang="0">
+                <a:pos x="connsiteX60" y="connsiteY60"/>
+              </a:cxn>
+              <a:cxn ang="0">
+                <a:pos x="connsiteX61" y="connsiteY61"/>
+              </a:cxn>
+              <a:cxn ang="0">
+                <a:pos x="connsiteX62" y="connsiteY62"/>
+              </a:cxn>
+              <a:cxn ang="0">
+                <a:pos x="connsiteX63" y="connsiteY63"/>
+              </a:cxn>
+              <a:cxn ang="0">
+                <a:pos x="connsiteX64" y="connsiteY64"/>
+              </a:cxn>
+              <a:cxn ang="0">
+                <a:pos x="connsiteX65" y="connsiteY65"/>
+              </a:cxn>
+              <a:cxn ang="0">
+                <a:pos x="connsiteX66" y="connsiteY66"/>
+              </a:cxn>
+              <a:cxn ang="0">
+                <a:pos x="connsiteX67" y="connsiteY67"/>
+              </a:cxn>
+              <a:cxn ang="0">
+                <a:pos x="connsiteX68" y="connsiteY68"/>
+              </a:cxn>
+              <a:cxn ang="0">
+                <a:pos x="connsiteX69" y="connsiteY69"/>
+              </a:cxn>
+              <a:cxn ang="0">
+                <a:pos x="connsiteX70" y="connsiteY70"/>
+              </a:cxn>
+              <a:cxn ang="0">
+                <a:pos x="connsiteX71" y="connsiteY71"/>
+              </a:cxn>
+            </a:cxnLst>
+            <a:rect l="l" t="t" r="r" b="b"/>
+            <a:pathLst>
+              <a:path w="2753139" h="1411356">
+                <a:moveTo>
+                  <a:pt x="785191" y="0"/>
+                </a:moveTo>
+                <a:lnTo>
+                  <a:pt x="785191" y="0"/>
+                </a:lnTo>
+                <a:lnTo>
+                  <a:pt x="556591" y="59634"/>
+                </a:lnTo>
+                <a:cubicBezTo>
+                  <a:pt x="523221" y="68735"/>
+                  <a:pt x="488429" y="74581"/>
+                  <a:pt x="457200" y="89452"/>
+                </a:cubicBezTo>
+                <a:cubicBezTo>
+                  <a:pt x="418199" y="108024"/>
+                  <a:pt x="384500" y="136132"/>
+                  <a:pt x="347869" y="159026"/>
+                </a:cubicBezTo>
+                <a:cubicBezTo>
+                  <a:pt x="331487" y="169264"/>
+                  <a:pt x="313628" y="177252"/>
+                  <a:pt x="298174" y="188843"/>
+                </a:cubicBezTo>
+                <a:cubicBezTo>
+                  <a:pt x="284922" y="198782"/>
+                  <a:pt x="272898" y="210615"/>
+                  <a:pt x="258417" y="218660"/>
+                </a:cubicBezTo>
+                <a:cubicBezTo>
+                  <a:pt x="242821" y="227325"/>
+                  <a:pt x="225286" y="231913"/>
+                  <a:pt x="208721" y="238539"/>
+                </a:cubicBezTo>
+                <a:cubicBezTo>
+                  <a:pt x="192156" y="255104"/>
+                  <a:pt x="177518" y="273852"/>
+                  <a:pt x="159026" y="288234"/>
+                </a:cubicBezTo>
+                <a:cubicBezTo>
+                  <a:pt x="106018" y="329463"/>
+                  <a:pt x="130390" y="283346"/>
+                  <a:pt x="89452" y="337930"/>
+                </a:cubicBezTo>
+                <a:cubicBezTo>
+                  <a:pt x="77861" y="353385"/>
+                  <a:pt x="68793" y="370617"/>
+                  <a:pt x="59634" y="387626"/>
+                </a:cubicBezTo>
+                <a:cubicBezTo>
+                  <a:pt x="35681" y="432110"/>
+                  <a:pt x="22005" y="454725"/>
+                  <a:pt x="9939" y="496956"/>
+                </a:cubicBezTo>
+                <a:cubicBezTo>
+                  <a:pt x="6186" y="510091"/>
+                  <a:pt x="3313" y="523461"/>
+                  <a:pt x="0" y="536713"/>
+                </a:cubicBezTo>
+                <a:cubicBezTo>
+                  <a:pt x="1197" y="551072"/>
+                  <a:pt x="3645" y="657862"/>
+                  <a:pt x="19878" y="695739"/>
+                </a:cubicBezTo>
+                <a:cubicBezTo>
+                  <a:pt x="24583" y="706718"/>
+                  <a:pt x="33130" y="715617"/>
+                  <a:pt x="39756" y="725556"/>
+                </a:cubicBezTo>
+                <a:cubicBezTo>
+                  <a:pt x="43069" y="738808"/>
+                  <a:pt x="44314" y="752757"/>
+                  <a:pt x="49695" y="765313"/>
+                </a:cubicBezTo>
+                <a:cubicBezTo>
+                  <a:pt x="54401" y="776293"/>
+                  <a:pt x="62631" y="785410"/>
+                  <a:pt x="69574" y="795130"/>
+                </a:cubicBezTo>
+                <a:cubicBezTo>
+                  <a:pt x="88928" y="822225"/>
+                  <a:pt x="103713" y="843458"/>
+                  <a:pt x="129208" y="864704"/>
+                </a:cubicBezTo>
+                <a:cubicBezTo>
+                  <a:pt x="138385" y="872351"/>
+                  <a:pt x="147999" y="879988"/>
+                  <a:pt x="159026" y="884582"/>
+                </a:cubicBezTo>
+                <a:cubicBezTo>
+                  <a:pt x="188039" y="896671"/>
+                  <a:pt x="222326" y="896966"/>
+                  <a:pt x="248478" y="914400"/>
+                </a:cubicBezTo>
+                <a:cubicBezTo>
+                  <a:pt x="300520" y="949094"/>
+                  <a:pt x="266442" y="932796"/>
+                  <a:pt x="357808" y="944217"/>
+                </a:cubicBezTo>
+                <a:cubicBezTo>
+                  <a:pt x="380999" y="954156"/>
+                  <a:pt x="403621" y="965548"/>
+                  <a:pt x="427382" y="974034"/>
+                </a:cubicBezTo>
+                <a:cubicBezTo>
+                  <a:pt x="450096" y="982146"/>
+                  <a:pt x="473651" y="987698"/>
+                  <a:pt x="496956" y="993913"/>
+                </a:cubicBezTo>
+                <a:cubicBezTo>
+                  <a:pt x="581166" y="1016369"/>
+                  <a:pt x="584407" y="1015379"/>
+                  <a:pt x="675860" y="1033669"/>
+                </a:cubicBezTo>
+                <a:cubicBezTo>
+                  <a:pt x="696607" y="1047500"/>
+                  <a:pt x="727815" y="1067508"/>
+                  <a:pt x="745434" y="1083365"/>
+                </a:cubicBezTo>
+                <a:cubicBezTo>
+                  <a:pt x="766330" y="1102171"/>
+                  <a:pt x="789475" y="1119609"/>
+                  <a:pt x="805069" y="1143000"/>
+                </a:cubicBezTo>
+                <a:cubicBezTo>
+                  <a:pt x="830145" y="1180614"/>
+                  <a:pt x="816500" y="1164371"/>
+                  <a:pt x="844826" y="1192695"/>
+                </a:cubicBezTo>
+                <a:cubicBezTo>
+                  <a:pt x="862496" y="1228036"/>
+                  <a:pt x="882269" y="1278061"/>
+                  <a:pt x="924339" y="1292086"/>
+                </a:cubicBezTo>
+                <a:lnTo>
+                  <a:pt x="954156" y="1302026"/>
+                </a:lnTo>
+                <a:cubicBezTo>
+                  <a:pt x="1009359" y="1357227"/>
+                  <a:pt x="965627" y="1326084"/>
+                  <a:pt x="1083365" y="1341782"/>
+                </a:cubicBezTo>
+                <a:cubicBezTo>
+                  <a:pt x="1100110" y="1344015"/>
+                  <a:pt x="1116671" y="1347624"/>
+                  <a:pt x="1133060" y="1351721"/>
+                </a:cubicBezTo>
+                <a:cubicBezTo>
+                  <a:pt x="1143224" y="1354262"/>
+                  <a:pt x="1152493" y="1360275"/>
+                  <a:pt x="1162878" y="1361660"/>
+                </a:cubicBezTo>
+                <a:cubicBezTo>
+                  <a:pt x="1202422" y="1366933"/>
+                  <a:pt x="1242391" y="1368287"/>
+                  <a:pt x="1282147" y="1371600"/>
+                </a:cubicBezTo>
+                <a:cubicBezTo>
+                  <a:pt x="1302025" y="1378226"/>
+                  <a:pt x="1321147" y="1387837"/>
+                  <a:pt x="1341782" y="1391478"/>
+                </a:cubicBezTo>
+                <a:cubicBezTo>
+                  <a:pt x="1377819" y="1397837"/>
+                  <a:pt x="1414840" y="1396581"/>
+                  <a:pt x="1451113" y="1401417"/>
+                </a:cubicBezTo>
+                <a:cubicBezTo>
+                  <a:pt x="1464653" y="1403222"/>
+                  <a:pt x="1477617" y="1408043"/>
+                  <a:pt x="1490869" y="1411356"/>
+                </a:cubicBezTo>
+                <a:cubicBezTo>
+                  <a:pt x="1646582" y="1408043"/>
+                  <a:pt x="1802509" y="1410219"/>
+                  <a:pt x="1958008" y="1401417"/>
+                </a:cubicBezTo>
+                <a:cubicBezTo>
+                  <a:pt x="1978928" y="1400233"/>
+                  <a:pt x="1997573" y="1387560"/>
+                  <a:pt x="2017643" y="1381539"/>
+                </a:cubicBezTo>
+                <a:cubicBezTo>
+                  <a:pt x="2030727" y="1377614"/>
+                  <a:pt x="2044148" y="1374913"/>
+                  <a:pt x="2057400" y="1371600"/>
+                </a:cubicBezTo>
+                <a:cubicBezTo>
+                  <a:pt x="2077297" y="1351702"/>
+                  <a:pt x="2090452" y="1336671"/>
+                  <a:pt x="2117034" y="1321904"/>
+                </a:cubicBezTo>
+                <a:cubicBezTo>
+                  <a:pt x="2132630" y="1313240"/>
+                  <a:pt x="2150772" y="1310005"/>
+                  <a:pt x="2166730" y="1302026"/>
+                </a:cubicBezTo>
+                <a:cubicBezTo>
+                  <a:pt x="2177414" y="1296684"/>
+                  <a:pt x="2186060" y="1287867"/>
+                  <a:pt x="2196547" y="1282147"/>
+                </a:cubicBezTo>
+                <a:cubicBezTo>
+                  <a:pt x="2222561" y="1267957"/>
+                  <a:pt x="2252354" y="1260171"/>
+                  <a:pt x="2276060" y="1242391"/>
+                </a:cubicBezTo>
+                <a:cubicBezTo>
+                  <a:pt x="2289312" y="1232452"/>
+                  <a:pt x="2300679" y="1219301"/>
+                  <a:pt x="2315817" y="1212573"/>
+                </a:cubicBezTo>
+                <a:cubicBezTo>
+                  <a:pt x="2331254" y="1205712"/>
+                  <a:pt x="2348948" y="1205947"/>
+                  <a:pt x="2365513" y="1202634"/>
+                </a:cubicBezTo>
+                <a:cubicBezTo>
+                  <a:pt x="2375452" y="1196008"/>
+                  <a:pt x="2384646" y="1188098"/>
+                  <a:pt x="2395330" y="1182756"/>
+                </a:cubicBezTo>
+                <a:cubicBezTo>
+                  <a:pt x="2422988" y="1168927"/>
+                  <a:pt x="2476830" y="1152277"/>
+                  <a:pt x="2504660" y="1143000"/>
+                </a:cubicBezTo>
+                <a:cubicBezTo>
+                  <a:pt x="2528419" y="1125180"/>
+                  <a:pt x="2581832" y="1088049"/>
+                  <a:pt x="2594113" y="1063486"/>
+                </a:cubicBezTo>
+                <a:lnTo>
+                  <a:pt x="2633869" y="983973"/>
+                </a:lnTo>
+                <a:cubicBezTo>
+                  <a:pt x="2640495" y="970721"/>
+                  <a:pt x="2650153" y="958591"/>
+                  <a:pt x="2653747" y="944217"/>
+                </a:cubicBezTo>
+                <a:cubicBezTo>
+                  <a:pt x="2657060" y="930965"/>
+                  <a:pt x="2658890" y="917250"/>
+                  <a:pt x="2663687" y="904460"/>
+                </a:cubicBezTo>
+                <a:cubicBezTo>
+                  <a:pt x="2668889" y="890587"/>
+                  <a:pt x="2677867" y="878380"/>
+                  <a:pt x="2683565" y="864704"/>
+                </a:cubicBezTo>
+                <a:cubicBezTo>
+                  <a:pt x="2694452" y="838575"/>
+                  <a:pt x="2703862" y="811849"/>
+                  <a:pt x="2713382" y="785191"/>
+                </a:cubicBezTo>
+                <a:cubicBezTo>
+                  <a:pt x="2720429" y="765458"/>
+                  <a:pt x="2729150" y="746103"/>
+                  <a:pt x="2733260" y="725556"/>
+                </a:cubicBezTo>
+                <a:cubicBezTo>
+                  <a:pt x="2745255" y="665587"/>
+                  <a:pt x="2737858" y="691887"/>
+                  <a:pt x="2753139" y="646043"/>
+                </a:cubicBezTo>
+                <a:cubicBezTo>
+                  <a:pt x="2746513" y="566530"/>
+                  <a:pt x="2744162" y="486544"/>
+                  <a:pt x="2733260" y="407504"/>
+                </a:cubicBezTo>
+                <a:cubicBezTo>
+                  <a:pt x="2730822" y="389830"/>
+                  <a:pt x="2724804" y="371514"/>
+                  <a:pt x="2713382" y="357808"/>
+                </a:cubicBezTo>
+                <a:cubicBezTo>
+                  <a:pt x="2706675" y="349760"/>
+                  <a:pt x="2693961" y="349168"/>
+                  <a:pt x="2683565" y="347869"/>
+                </a:cubicBezTo>
+                <a:cubicBezTo>
+                  <a:pt x="2614216" y="339200"/>
+                  <a:pt x="2544417" y="334617"/>
+                  <a:pt x="2474843" y="327991"/>
+                </a:cubicBezTo>
+                <a:cubicBezTo>
+                  <a:pt x="2408508" y="271133"/>
+                  <a:pt x="2405436" y="275204"/>
+                  <a:pt x="2355574" y="208721"/>
+                </a:cubicBezTo>
+                <a:cubicBezTo>
+                  <a:pt x="2321374" y="163121"/>
+                  <a:pt x="2281673" y="120555"/>
+                  <a:pt x="2256182" y="69573"/>
+                </a:cubicBezTo>
+                <a:cubicBezTo>
+                  <a:pt x="2249556" y="56321"/>
+                  <a:pt x="2245789" y="41199"/>
+                  <a:pt x="2236304" y="29817"/>
+                </a:cubicBezTo>
+                <a:cubicBezTo>
+                  <a:pt x="2218241" y="8142"/>
+                  <a:pt x="2191636" y="6226"/>
+                  <a:pt x="2166730" y="0"/>
+                </a:cubicBezTo>
+                <a:lnTo>
+                  <a:pt x="1699591" y="9939"/>
+                </a:lnTo>
+                <a:cubicBezTo>
+                  <a:pt x="1663019" y="11200"/>
+                  <a:pt x="1626297" y="13519"/>
+                  <a:pt x="1590260" y="19878"/>
+                </a:cubicBezTo>
+                <a:cubicBezTo>
+                  <a:pt x="1563497" y="24601"/>
+                  <a:pt x="1481479" y="59360"/>
+                  <a:pt x="1461052" y="69573"/>
+                </a:cubicBezTo>
+                <a:cubicBezTo>
+                  <a:pt x="1443773" y="78212"/>
+                  <a:pt x="1429009" y="91545"/>
+                  <a:pt x="1411356" y="99391"/>
+                </a:cubicBezTo>
+                <a:cubicBezTo>
+                  <a:pt x="1398874" y="104939"/>
+                  <a:pt x="1384852" y="106017"/>
+                  <a:pt x="1371600" y="109330"/>
+                </a:cubicBezTo>
+                <a:cubicBezTo>
+                  <a:pt x="1311965" y="102704"/>
+                  <a:pt x="1252094" y="97938"/>
+                  <a:pt x="1192695" y="89452"/>
+                </a:cubicBezTo>
+                <a:cubicBezTo>
+                  <a:pt x="1136078" y="81364"/>
+                  <a:pt x="1079214" y="73505"/>
+                  <a:pt x="1023730" y="59634"/>
+                </a:cubicBezTo>
+                <a:cubicBezTo>
+                  <a:pt x="921490" y="34074"/>
+                  <a:pt x="971262" y="43620"/>
+                  <a:pt x="874643" y="29817"/>
+                </a:cubicBezTo>
+                <a:cubicBezTo>
+                  <a:pt x="810563" y="8457"/>
+                  <a:pt x="829824" y="24755"/>
+                  <a:pt x="785191" y="0"/>
+                </a:cubicBezTo>
+                <a:close/>
+              </a:path>
+            </a:pathLst>
+          </a:custGeom>
+          <a:solidFill>
+            <a:srgbClr val="E0E9C4"/>
+          </a:solidFill>
+          <a:ln w="25400">
+            <a:solidFill>
+              <a:schemeClr val="tx1"/>
+            </a:solidFill>
+          </a:ln>
+        </p:spPr>
+        <p:style>
+          <a:lnRef idx="2">
+            <a:schemeClr val="accent1">
+              <a:shade val="15000"/>
+            </a:schemeClr>
+          </a:lnRef>
+          <a:fillRef idx="1">
+            <a:schemeClr val="accent1"/>
+          </a:fillRef>
+          <a:effectRef idx="0">
+            <a:schemeClr val="accent1"/>
+          </a:effectRef>
+          <a:fontRef idx="minor">
+            <a:schemeClr val="lt1"/>
+          </a:fontRef>
+        </p:style>
+        <p:txBody>
+          <a:bodyPr rtlCol="0" anchor="ctr"/>
+          <a:lstStyle/>
+          <a:p>
+            <a:pPr algn="ctr"/>
+            <a:endParaRPr lang="hu-HU"/>
+          </a:p>
+        </p:txBody>
+      </p:sp>
+      <p:cxnSp>
+        <p:nvCxnSpPr>
+          <p:cNvPr id="15" name="Egyenes összekötő nyíllal 14">
+            <a:extLst>
+              <a:ext uri="{FF2B5EF4-FFF2-40B4-BE49-F238E27FC236}">
+                <a16:creationId xmlns:a16="http://schemas.microsoft.com/office/drawing/2014/main" id="{659BCFBB-8262-87F4-03DE-AF5E044017DA}"/>
+              </a:ext>
+            </a:extLst>
+          </p:cNvPr>
+          <p:cNvCxnSpPr>
+            <a:cxnSpLocks/>
+          </p:cNvCxnSpPr>
+          <p:nvPr/>
+        </p:nvCxnSpPr>
+        <p:spPr>
+          <a:xfrm flipV="1">
+            <a:off x="7079037" y="2366252"/>
+            <a:ext cx="1080000" cy="2879826"/>
+          </a:xfrm>
+          <a:prstGeom prst="straightConnector1">
+            <a:avLst/>
+          </a:prstGeom>
+          <a:ln w="25400">
+            <a:solidFill>
+              <a:srgbClr val="819839"/>
+            </a:solidFill>
+            <a:tailEnd type="triangle"/>
+          </a:ln>
+        </p:spPr>
+        <p:style>
+          <a:lnRef idx="1">
+            <a:schemeClr val="accent1"/>
+          </a:lnRef>
+          <a:fillRef idx="0">
+            <a:schemeClr val="accent1"/>
+          </a:fillRef>
+          <a:effectRef idx="0">
+            <a:schemeClr val="accent1"/>
+          </a:effectRef>
+          <a:fontRef idx="minor">
+            <a:schemeClr val="tx1"/>
+          </a:fontRef>
+        </p:style>
+      </p:cxnSp>
+      <p:cxnSp>
+        <p:nvCxnSpPr>
+          <p:cNvPr id="16" name="Egyenes összekötő nyíllal 15">
+            <a:extLst>
+              <a:ext uri="{FF2B5EF4-FFF2-40B4-BE49-F238E27FC236}">
+                <a16:creationId xmlns:a16="http://schemas.microsoft.com/office/drawing/2014/main" id="{3D8DED58-CFEC-688D-2DD4-BA37C417E2D4}"/>
+              </a:ext>
+            </a:extLst>
+          </p:cNvPr>
+          <p:cNvCxnSpPr/>
+          <p:nvPr/>
+        </p:nvCxnSpPr>
+        <p:spPr>
+          <a:xfrm flipV="1">
+            <a:off x="7829715" y="1507239"/>
+            <a:ext cx="1080000" cy="2879826"/>
+          </a:xfrm>
+          <a:prstGeom prst="straightConnector1">
+            <a:avLst/>
+          </a:prstGeom>
+          <a:ln w="25400">
+            <a:solidFill>
+              <a:srgbClr val="819839"/>
+            </a:solidFill>
+            <a:tailEnd type="triangle"/>
+          </a:ln>
+        </p:spPr>
+        <p:style>
+          <a:lnRef idx="1">
+            <a:schemeClr val="accent1"/>
+          </a:lnRef>
+          <a:fillRef idx="0">
+            <a:schemeClr val="accent1"/>
+          </a:fillRef>
+          <a:effectRef idx="0">
+            <a:schemeClr val="accent1"/>
+          </a:effectRef>
+          <a:fontRef idx="minor">
+            <a:schemeClr val="tx1"/>
+          </a:fontRef>
+        </p:style>
+      </p:cxnSp>
+      <p:cxnSp>
+        <p:nvCxnSpPr>
+          <p:cNvPr id="19" name="Egyenes összekötő nyíllal 18">
+            <a:extLst>
+              <a:ext uri="{FF2B5EF4-FFF2-40B4-BE49-F238E27FC236}">
+                <a16:creationId xmlns:a16="http://schemas.microsoft.com/office/drawing/2014/main" id="{2AB64952-B603-C4E5-204F-994C88F79CA2}"/>
+              </a:ext>
+            </a:extLst>
+          </p:cNvPr>
+          <p:cNvCxnSpPr/>
+          <p:nvPr/>
+        </p:nvCxnSpPr>
+        <p:spPr>
+          <a:xfrm flipV="1">
+            <a:off x="9263952" y="2702797"/>
+            <a:ext cx="1080000" cy="2879826"/>
+          </a:xfrm>
+          <a:prstGeom prst="straightConnector1">
+            <a:avLst/>
+          </a:prstGeom>
+          <a:ln w="25400">
+            <a:solidFill>
+              <a:srgbClr val="819839"/>
+            </a:solidFill>
+            <a:tailEnd type="triangle"/>
+          </a:ln>
+        </p:spPr>
+        <p:style>
+          <a:lnRef idx="1">
+            <a:schemeClr val="accent1"/>
+          </a:lnRef>
+          <a:fillRef idx="0">
+            <a:schemeClr val="accent1"/>
+          </a:fillRef>
+          <a:effectRef idx="0">
+            <a:schemeClr val="accent1"/>
+          </a:effectRef>
+          <a:fontRef idx="minor">
+            <a:schemeClr val="tx1"/>
+          </a:fontRef>
+        </p:style>
+      </p:cxnSp>
+      <p:cxnSp>
+        <p:nvCxnSpPr>
+          <p:cNvPr id="20" name="Egyenes összekötő nyíllal 19">
+            <a:extLst>
+              <a:ext uri="{FF2B5EF4-FFF2-40B4-BE49-F238E27FC236}">
+                <a16:creationId xmlns:a16="http://schemas.microsoft.com/office/drawing/2014/main" id="{7B32ECD8-3F46-27DE-0ED0-AD7A82527352}"/>
+              </a:ext>
+            </a:extLst>
+          </p:cNvPr>
+          <p:cNvCxnSpPr/>
+          <p:nvPr/>
+        </p:nvCxnSpPr>
+        <p:spPr>
+          <a:xfrm flipV="1">
+            <a:off x="9272383" y="1581999"/>
+            <a:ext cx="1080000" cy="2879826"/>
+          </a:xfrm>
+          <a:prstGeom prst="straightConnector1">
+            <a:avLst/>
+          </a:prstGeom>
+          <a:ln w="25400">
+            <a:solidFill>
+              <a:srgbClr val="819839"/>
+            </a:solidFill>
+            <a:tailEnd type="triangle"/>
+          </a:ln>
+        </p:spPr>
+        <p:style>
+          <a:lnRef idx="1">
+            <a:schemeClr val="accent1"/>
+          </a:lnRef>
+          <a:fillRef idx="0">
+            <a:schemeClr val="accent1"/>
+          </a:fillRef>
+          <a:effectRef idx="0">
+            <a:schemeClr val="accent1"/>
+          </a:effectRef>
+          <a:fontRef idx="minor">
+            <a:schemeClr val="tx1"/>
+          </a:fontRef>
+        </p:style>
+      </p:cxnSp>
+      <p:cxnSp>
+        <p:nvCxnSpPr>
+          <p:cNvPr id="21" name="Egyenes összekötő nyíllal 20">
+            <a:extLst>
+              <a:ext uri="{FF2B5EF4-FFF2-40B4-BE49-F238E27FC236}">
+                <a16:creationId xmlns:a16="http://schemas.microsoft.com/office/drawing/2014/main" id="{36EC5E13-9A54-1C65-4B0C-C07846C094BA}"/>
+              </a:ext>
+            </a:extLst>
+          </p:cNvPr>
+          <p:cNvCxnSpPr/>
+          <p:nvPr/>
+        </p:nvCxnSpPr>
+        <p:spPr>
+          <a:xfrm flipV="1">
+            <a:off x="6901529" y="1863616"/>
+            <a:ext cx="1080000" cy="2879826"/>
+          </a:xfrm>
+          <a:prstGeom prst="straightConnector1">
+            <a:avLst/>
+          </a:prstGeom>
+          <a:ln w="25400">
+            <a:solidFill>
+              <a:srgbClr val="819839"/>
+            </a:solidFill>
+            <a:prstDash val="dash"/>
+            <a:tailEnd type="triangle"/>
+          </a:ln>
+        </p:spPr>
+        <p:style>
+          <a:lnRef idx="1">
+            <a:schemeClr val="accent1"/>
+          </a:lnRef>
+          <a:fillRef idx="0">
+            <a:schemeClr val="accent1"/>
+          </a:fillRef>
+          <a:effectRef idx="0">
+            <a:schemeClr val="accent1"/>
+          </a:effectRef>
+          <a:fontRef idx="minor">
+            <a:schemeClr val="tx1"/>
+          </a:fontRef>
+        </p:style>
+      </p:cxnSp>
+      <p:sp>
+        <p:nvSpPr>
+          <p:cNvPr id="22" name="Szövegdoboz 21">
+            <a:extLst>
+              <a:ext uri="{FF2B5EF4-FFF2-40B4-BE49-F238E27FC236}">
+                <a16:creationId xmlns:a16="http://schemas.microsoft.com/office/drawing/2014/main" id="{0CDCB04C-3D3D-48AB-413B-8152D086D71A}"/>
+              </a:ext>
+            </a:extLst>
+          </p:cNvPr>
+          <p:cNvSpPr txBox="1"/>
+          <p:nvPr/>
+        </p:nvSpPr>
+        <p:spPr>
+          <a:xfrm>
+            <a:off x="6034753" y="2846053"/>
+            <a:ext cx="1707739" cy="446276"/>
+          </a:xfrm>
+          <a:prstGeom prst="rect">
+            <a:avLst/>
+          </a:prstGeom>
+          <a:noFill/>
+        </p:spPr>
+        <p:txBody>
+          <a:bodyPr wrap="square" rtlCol="0">
+            <a:spAutoFit/>
+          </a:bodyPr>
+          <a:lstStyle/>
+          <a:p>
+            <a:pPr algn="ctr"/>
+            <a:r>
+              <a:rPr lang="hu-HU" sz="2300" dirty="0">
+                <a:latin typeface="Times New Roman" panose="02020603050405020304" pitchFamily="18" charset="0"/>
+                <a:cs typeface="Times New Roman" panose="02020603050405020304" pitchFamily="18" charset="0"/>
+              </a:rPr>
+              <a:t>alkotó</a:t>
+            </a:r>
+          </a:p>
+        </p:txBody>
+      </p:sp>
+      <p:sp>
+        <p:nvSpPr>
+          <p:cNvPr id="23" name="Szövegdoboz 22">
+            <a:extLst>
+              <a:ext uri="{FF2B5EF4-FFF2-40B4-BE49-F238E27FC236}">
+                <a16:creationId xmlns:a16="http://schemas.microsoft.com/office/drawing/2014/main" id="{E4A23A7A-84AE-A1B3-74BF-80AAE5EDCC0B}"/>
+              </a:ext>
+            </a:extLst>
+          </p:cNvPr>
+          <p:cNvSpPr txBox="1"/>
+          <p:nvPr/>
+        </p:nvSpPr>
+        <p:spPr>
+          <a:xfrm>
+            <a:off x="8481427" y="1868440"/>
+            <a:ext cx="1707739" cy="446276"/>
+          </a:xfrm>
+          <a:prstGeom prst="rect">
+            <a:avLst/>
+          </a:prstGeom>
+          <a:noFill/>
+        </p:spPr>
+        <p:txBody>
+          <a:bodyPr wrap="square" rtlCol="0">
+            <a:spAutoFit/>
+          </a:bodyPr>
+          <a:lstStyle/>
+          <a:p>
+            <a:pPr algn="ctr"/>
+            <a:r>
+              <a:rPr lang="hu-HU" sz="2300" dirty="0">
+                <a:latin typeface="Times New Roman" panose="02020603050405020304" pitchFamily="18" charset="0"/>
+                <a:cs typeface="Times New Roman" panose="02020603050405020304" pitchFamily="18" charset="0"/>
+              </a:rPr>
+              <a:t>fedőlap</a:t>
+            </a:r>
+          </a:p>
+        </p:txBody>
+      </p:sp>
+      <p:sp>
+        <p:nvSpPr>
+          <p:cNvPr id="24" name="Szövegdoboz 23">
+            <a:extLst>
+              <a:ext uri="{FF2B5EF4-FFF2-40B4-BE49-F238E27FC236}">
+                <a16:creationId xmlns:a16="http://schemas.microsoft.com/office/drawing/2014/main" id="{DD724500-23D5-CD34-B211-1FA87B9DA279}"/>
+              </a:ext>
+            </a:extLst>
+          </p:cNvPr>
+          <p:cNvSpPr txBox="1"/>
+          <p:nvPr/>
+        </p:nvSpPr>
+        <p:spPr>
+          <a:xfrm>
+            <a:off x="7461338" y="4816862"/>
+            <a:ext cx="1707739" cy="446276"/>
+          </a:xfrm>
+          <a:prstGeom prst="rect">
+            <a:avLst/>
+          </a:prstGeom>
+          <a:noFill/>
+        </p:spPr>
+        <p:txBody>
+          <a:bodyPr wrap="square" rtlCol="0">
+            <a:spAutoFit/>
+          </a:bodyPr>
+          <a:lstStyle/>
+          <a:p>
+            <a:pPr algn="ctr"/>
+            <a:r>
+              <a:rPr lang="hu-HU" sz="2300" dirty="0">
+                <a:latin typeface="Times New Roman" panose="02020603050405020304" pitchFamily="18" charset="0"/>
+                <a:cs typeface="Times New Roman" panose="02020603050405020304" pitchFamily="18" charset="0"/>
+              </a:rPr>
+              <a:t>alaplap</a:t>
+            </a:r>
+          </a:p>
+        </p:txBody>
+      </p:sp>
+    </p:spTree>
+    <p:extLst>
+      <p:ext uri="{BB962C8B-B14F-4D97-AF65-F5344CB8AC3E}">
+        <p14:creationId xmlns:p14="http://schemas.microsoft.com/office/powerpoint/2010/main" val="479841053"/>
+      </p:ext>
+    </p:extLst>
+  </p:cSld>
+  <p:clrMapOvr>
+    <a:masterClrMapping/>
+  </p:clrMapOvr>
+  <p:timing>
+    <p:tnLst>
+      <p:par>
+        <p:cTn id="1" dur="indefinite" restart="never" nodeType="tmRoot">
+          <p:childTnLst>
+            <p:seq concurrent="1" nextAc="seek">
+              <p:cTn id="2" dur="indefinite" nodeType="mainSeq">
+                <p:childTnLst>
+                  <p:par>
+                    <p:cTn id="3" fill="hold">
+                      <p:stCondLst>
+                        <p:cond delay="indefinite"/>
+                      </p:stCondLst>
+                      <p:childTnLst>
+                        <p:par>
+                          <p:cTn id="4" fill="hold">
+                            <p:stCondLst>
+                              <p:cond delay="0"/>
+                            </p:stCondLst>
+                            <p:childTnLst>
+                              <p:par>
+                                <p:cTn id="5" presetID="42" presetClass="path" presetSubtype="0" accel="50000" decel="50000" fill="hold" grpId="0" nodeType="clickEffect">
+                                  <p:stCondLst>
+                                    <p:cond delay="0"/>
+                                  </p:stCondLst>
+                                  <p:childTnLst>
+                                    <p:animMotion origin="layout" path="M 2.48174E-6 -4.86526E-6 L 0.0937 -0.44757 " pathEditMode="relative" rAng="0" ptsTypes="AA">
+                                      <p:cBhvr>
+                                        <p:cTn id="6" dur="2000" fill="hold"/>
+                                        <p:tgtEl>
+                                          <p:spTgt spid="25"/>
+                                        </p:tgtEl>
+                                        <p:attrNameLst>
+                                          <p:attrName>ppt_x</p:attrName>
+                                          <p:attrName>ppt_y</p:attrName>
+                                        </p:attrNameLst>
+                                      </p:cBhvr>
+                                      <p:rCtr x="4685" y="-22391"/>
+                                    </p:animMotion>
+                                  </p:childTnLst>
+                                </p:cTn>
+                              </p:par>
+                            </p:childTnLst>
+                          </p:cTn>
+                        </p:par>
+                      </p:childTnLst>
+                    </p:cTn>
+                  </p:par>
+                </p:childTnLst>
+              </p:cTn>
+              <p:prevCondLst>
+                <p:cond evt="onPrev" delay="0">
+                  <p:tgtEl>
+                    <p:sldTgt/>
+                  </p:tgtEl>
+                </p:cond>
+              </p:prevCondLst>
+              <p:nextCondLst>
+                <p:cond evt="onNext" delay="0">
+                  <p:tgtEl>
+                    <p:sldTgt/>
+                  </p:tgtEl>
+                </p:cond>
+              </p:nextCondLst>
+            </p:seq>
+          </p:childTnLst>
+        </p:cTn>
+      </p:par>
+    </p:tnLst>
+    <p:bldLst>
+      <p:bldP spid="25" grpId="0" animBg="1"/>
+    </p:bldLst>
+  </p:timing>
 </p:sld>
 </file>
 

</xml_diff>